<commit_message>
git ignore, bunch of baseline models
</commit_message>
<xml_diff>
--- a/presentation/Optimizing Trading Strategies with Reinforcement Learning.pptx
+++ b/presentation/Optimizing Trading Strategies with Reinforcement Learning.pptx
@@ -5,7 +5,7 @@
     <p:sldMasterId id="2147483660" r:id="rId4"/>
   </p:sldMasterIdLst>
   <p:notesMasterIdLst>
-    <p:notesMasterId r:id="rId24"/>
+    <p:notesMasterId r:id="rId31"/>
   </p:notesMasterIdLst>
   <p:sldIdLst>
     <p:sldId id="256" r:id="rId5"/>
@@ -22,11 +22,18 @@
     <p:sldId id="277" r:id="rId16"/>
     <p:sldId id="279" r:id="rId17"/>
     <p:sldId id="282" r:id="rId18"/>
-    <p:sldId id="283" r:id="rId19"/>
-    <p:sldId id="284" r:id="rId20"/>
-    <p:sldId id="286" r:id="rId21"/>
-    <p:sldId id="285" r:id="rId22"/>
-    <p:sldId id="268" r:id="rId23"/>
+    <p:sldId id="289" r:id="rId19"/>
+    <p:sldId id="290" r:id="rId20"/>
+    <p:sldId id="283" r:id="rId21"/>
+    <p:sldId id="284" r:id="rId22"/>
+    <p:sldId id="286" r:id="rId23"/>
+    <p:sldId id="285" r:id="rId24"/>
+    <p:sldId id="291" r:id="rId25"/>
+    <p:sldId id="292" r:id="rId26"/>
+    <p:sldId id="287" r:id="rId27"/>
+    <p:sldId id="293" r:id="rId28"/>
+    <p:sldId id="294" r:id="rId29"/>
+    <p:sldId id="268" r:id="rId30"/>
   </p:sldIdLst>
   <p:sldSz cx="12192000" cy="6858000"/>
   <p:notesSz cx="6858000" cy="9144000"/>
@@ -729,6 +736,518 @@
 </p:notes>
 </file>
 
+<file path=ppt/notesSlides/notesSlide10.xml><?xml version="1.0" encoding="utf-8"?>
+<p:notes xmlns:a="http://schemas.openxmlformats.org/drawingml/2006/main" xmlns:r="http://schemas.openxmlformats.org/officeDocument/2006/relationships" xmlns:p="http://schemas.openxmlformats.org/presentationml/2006/main">
+  <p:cSld>
+    <p:spTree>
+      <p:nvGrpSpPr>
+        <p:cNvPr id="1" name=""/>
+        <p:cNvGrpSpPr/>
+        <p:nvPr/>
+      </p:nvGrpSpPr>
+      <p:grpSpPr>
+        <a:xfrm>
+          <a:off x="0" y="0"/>
+          <a:ext cx="0" cy="0"/>
+          <a:chOff x="0" y="0"/>
+          <a:chExt cx="0" cy="0"/>
+        </a:xfrm>
+      </p:grpSpPr>
+      <p:sp>
+        <p:nvSpPr>
+          <p:cNvPr id="2" name="Slide Image Placeholder 1"/>
+          <p:cNvSpPr>
+            <a:spLocks noGrp="1" noRot="1" noChangeAspect="1"/>
+          </p:cNvSpPr>
+          <p:nvPr>
+            <p:ph type="sldImg"/>
+          </p:nvPr>
+        </p:nvSpPr>
+        <p:spPr/>
+      </p:sp>
+      <p:sp>
+        <p:nvSpPr>
+          <p:cNvPr id="3" name="Notes Placeholder 2"/>
+          <p:cNvSpPr>
+            <a:spLocks noGrp="1"/>
+          </p:cNvSpPr>
+          <p:nvPr>
+            <p:ph type="body" idx="1"/>
+          </p:nvPr>
+        </p:nvSpPr>
+        <p:spPr/>
+        <p:txBody>
+          <a:bodyPr/>
+          <a:lstStyle/>
+          <a:p>
+            <a:pPr marL="0" marR="0" lvl="0" indent="0" algn="l" defTabSz="914400" rtl="0" eaLnBrk="1" fontAlgn="auto" latinLnBrk="0" hangingPunct="1">
+              <a:lnSpc>
+                <a:spcPct val="100000"/>
+              </a:lnSpc>
+              <a:spcBef>
+                <a:spcPts val="0"/>
+              </a:spcBef>
+              <a:spcAft>
+                <a:spcPts val="0"/>
+              </a:spcAft>
+              <a:buClrTx/>
+              <a:buSzTx/>
+              <a:buFontTx/>
+              <a:buNone/>
+              <a:tabLst/>
+              <a:defRPr/>
+            </a:pPr>
+            <a:r>
+              <a:rPr lang="en-US" b="0" i="0" dirty="0">
+                <a:solidFill>
+                  <a:srgbClr val="ECECEC"/>
+                </a:solidFill>
+                <a:effectLst/>
+                <a:highlight>
+                  <a:srgbClr val="212121"/>
+                </a:highlight>
+                <a:latin typeface="Söhne"/>
+              </a:rPr>
+              <a:t>Database config :</a:t>
+            </a:r>
+          </a:p>
+          <a:p>
+            <a:pPr marL="0" marR="0" lvl="0" indent="0" algn="l" defTabSz="914400" rtl="0" eaLnBrk="1" fontAlgn="auto" latinLnBrk="0" hangingPunct="1">
+              <a:lnSpc>
+                <a:spcPct val="100000"/>
+              </a:lnSpc>
+              <a:spcBef>
+                <a:spcPts val="0"/>
+              </a:spcBef>
+              <a:spcAft>
+                <a:spcPts val="0"/>
+              </a:spcAft>
+              <a:buClrTx/>
+              <a:buSzTx/>
+              <a:buFontTx/>
+              <a:buNone/>
+              <a:tabLst/>
+              <a:defRPr/>
+            </a:pPr>
+            <a:r>
+              <a:rPr lang="en-US" b="0" i="0" dirty="0">
+                <a:solidFill>
+                  <a:srgbClr val="ECECEC"/>
+                </a:solidFill>
+                <a:effectLst/>
+                <a:highlight>
+                  <a:srgbClr val="212121"/>
+                </a:highlight>
+                <a:latin typeface="Söhne"/>
+              </a:rPr>
+              <a:t>Based on system requirements, choose a relational database like PostgreSQL for structured data or a NoSQL database if unstructured or semi-structured data is also involved.</a:t>
+            </a:r>
+          </a:p>
+          <a:p>
+            <a:pPr marL="171450" marR="0" lvl="0" indent="-171450" algn="l" defTabSz="914400" rtl="0" eaLnBrk="1" fontAlgn="auto" latinLnBrk="0" hangingPunct="1">
+              <a:lnSpc>
+                <a:spcPct val="100000"/>
+              </a:lnSpc>
+              <a:spcBef>
+                <a:spcPts val="0"/>
+              </a:spcBef>
+              <a:spcAft>
+                <a:spcPts val="0"/>
+              </a:spcAft>
+              <a:buClrTx/>
+              <a:buSzTx/>
+              <a:buFontTx/>
+              <a:buChar char="-"/>
+              <a:tabLst/>
+              <a:defRPr/>
+            </a:pPr>
+            <a:r>
+              <a:rPr lang="en-US" b="0" i="0" dirty="0">
+                <a:solidFill>
+                  <a:srgbClr val="ECECEC"/>
+                </a:solidFill>
+                <a:effectLst/>
+                <a:highlight>
+                  <a:srgbClr val="212121"/>
+                </a:highlight>
+                <a:latin typeface="Söhne"/>
+              </a:rPr>
+              <a:t>Server Config - Determine if the database will be hosted on-premises or in the cloud. Set up and configure the necessary servers or cloud services.</a:t>
+            </a:r>
+          </a:p>
+          <a:p>
+            <a:pPr marL="171450" marR="0" lvl="0" indent="-171450" algn="l" defTabSz="914400" rtl="0" eaLnBrk="1" fontAlgn="auto" latinLnBrk="0" hangingPunct="1">
+              <a:lnSpc>
+                <a:spcPct val="100000"/>
+              </a:lnSpc>
+              <a:spcBef>
+                <a:spcPts val="0"/>
+              </a:spcBef>
+              <a:spcAft>
+                <a:spcPts val="0"/>
+              </a:spcAft>
+              <a:buClrTx/>
+              <a:buSzTx/>
+              <a:buFontTx/>
+              <a:buChar char="-"/>
+              <a:tabLst/>
+              <a:defRPr/>
+            </a:pPr>
+            <a:r>
+              <a:rPr lang="en-US" b="0" i="0" dirty="0">
+                <a:solidFill>
+                  <a:srgbClr val="ECECEC"/>
+                </a:solidFill>
+                <a:effectLst/>
+                <a:highlight>
+                  <a:srgbClr val="212121"/>
+                </a:highlight>
+                <a:latin typeface="Söhne"/>
+              </a:rPr>
+              <a:t>Storage planning </a:t>
+            </a:r>
+          </a:p>
+          <a:p>
+            <a:pPr marL="171450" marR="0" lvl="0" indent="-171450" algn="l" defTabSz="914400" rtl="0" eaLnBrk="1" fontAlgn="auto" latinLnBrk="0" hangingPunct="1">
+              <a:lnSpc>
+                <a:spcPct val="100000"/>
+              </a:lnSpc>
+              <a:spcBef>
+                <a:spcPts val="0"/>
+              </a:spcBef>
+              <a:spcAft>
+                <a:spcPts val="0"/>
+              </a:spcAft>
+              <a:buClrTx/>
+              <a:buSzTx/>
+              <a:buFontTx/>
+              <a:buChar char="-"/>
+              <a:tabLst/>
+              <a:defRPr/>
+            </a:pPr>
+            <a:r>
+              <a:rPr lang="en-US" b="0" i="0" dirty="0">
+                <a:solidFill>
+                  <a:srgbClr val="ECECEC"/>
+                </a:solidFill>
+                <a:effectLst/>
+                <a:highlight>
+                  <a:srgbClr val="212121"/>
+                </a:highlight>
+                <a:latin typeface="Söhne"/>
+              </a:rPr>
+              <a:t>Memory and Compute resources</a:t>
+            </a:r>
+          </a:p>
+          <a:p>
+            <a:pPr marL="0" marR="0" lvl="0" indent="0" algn="l" defTabSz="914400" rtl="0" eaLnBrk="1" fontAlgn="auto" latinLnBrk="0" hangingPunct="1">
+              <a:lnSpc>
+                <a:spcPct val="100000"/>
+              </a:lnSpc>
+              <a:spcBef>
+                <a:spcPts val="0"/>
+              </a:spcBef>
+              <a:spcAft>
+                <a:spcPts val="0"/>
+              </a:spcAft>
+              <a:buClrTx/>
+              <a:buSzTx/>
+              <a:buFontTx/>
+              <a:buNone/>
+              <a:tabLst/>
+              <a:defRPr/>
+            </a:pPr>
+            <a:endParaRPr lang="en-US" b="0" i="0" dirty="0">
+              <a:solidFill>
+                <a:srgbClr val="ECECEC"/>
+              </a:solidFill>
+              <a:effectLst/>
+              <a:highlight>
+                <a:srgbClr val="212121"/>
+              </a:highlight>
+              <a:latin typeface="Söhne"/>
+            </a:endParaRPr>
+          </a:p>
+          <a:p>
+            <a:pPr marL="0" marR="0" lvl="0" indent="0" algn="l" defTabSz="914400" rtl="0" eaLnBrk="1" fontAlgn="auto" latinLnBrk="0" hangingPunct="1">
+              <a:lnSpc>
+                <a:spcPct val="100000"/>
+              </a:lnSpc>
+              <a:spcBef>
+                <a:spcPts val="0"/>
+              </a:spcBef>
+              <a:spcAft>
+                <a:spcPts val="0"/>
+              </a:spcAft>
+              <a:buClrTx/>
+              <a:buSzTx/>
+              <a:buFontTx/>
+              <a:buNone/>
+              <a:tabLst/>
+              <a:defRPr/>
+            </a:pPr>
+            <a:r>
+              <a:rPr lang="en-US" b="1" i="0" dirty="0">
+                <a:solidFill>
+                  <a:srgbClr val="ECECEC"/>
+                </a:solidFill>
+                <a:effectLst/>
+                <a:highlight>
+                  <a:srgbClr val="212121"/>
+                </a:highlight>
+                <a:latin typeface="Söhne"/>
+              </a:rPr>
+              <a:t>RL Agent</a:t>
+            </a:r>
+            <a:r>
+              <a:rPr lang="en-US" b="0" i="0" dirty="0">
+                <a:solidFill>
+                  <a:srgbClr val="ECECEC"/>
+                </a:solidFill>
+                <a:effectLst/>
+                <a:highlight>
+                  <a:srgbClr val="212121"/>
+                </a:highlight>
+                <a:latin typeface="Söhne"/>
+              </a:rPr>
+              <a:t>: A core component of the system, the RL agent, uses the processed data to make decisions. It learns from historical data to make predictions and take actions that maximize some notion of cumulative financial reward.</a:t>
+            </a:r>
+          </a:p>
+          <a:p>
+            <a:pPr marL="0" marR="0" lvl="0" indent="0" algn="l" defTabSz="914400" rtl="0" eaLnBrk="1" fontAlgn="auto" latinLnBrk="0" hangingPunct="1">
+              <a:lnSpc>
+                <a:spcPct val="100000"/>
+              </a:lnSpc>
+              <a:spcBef>
+                <a:spcPts val="0"/>
+              </a:spcBef>
+              <a:spcAft>
+                <a:spcPts val="0"/>
+              </a:spcAft>
+              <a:buClrTx/>
+              <a:buSzTx/>
+              <a:buFontTx/>
+              <a:buNone/>
+              <a:tabLst/>
+              <a:defRPr/>
+            </a:pPr>
+            <a:endParaRPr lang="en-US" b="0" i="0" dirty="0">
+              <a:solidFill>
+                <a:srgbClr val="ECECEC"/>
+              </a:solidFill>
+              <a:effectLst/>
+              <a:highlight>
+                <a:srgbClr val="212121"/>
+              </a:highlight>
+              <a:latin typeface="Söhne"/>
+            </a:endParaRPr>
+          </a:p>
+          <a:p>
+            <a:pPr marL="0" marR="0" lvl="0" indent="0" algn="l" defTabSz="914400" rtl="0" eaLnBrk="1" fontAlgn="auto" latinLnBrk="0" hangingPunct="1">
+              <a:lnSpc>
+                <a:spcPct val="100000"/>
+              </a:lnSpc>
+              <a:spcBef>
+                <a:spcPts val="0"/>
+              </a:spcBef>
+              <a:spcAft>
+                <a:spcPts val="0"/>
+              </a:spcAft>
+              <a:buClrTx/>
+              <a:buSzTx/>
+              <a:buFontTx/>
+              <a:buNone/>
+              <a:tabLst/>
+              <a:defRPr/>
+            </a:pPr>
+            <a:r>
+              <a:rPr lang="en-US" b="1" i="0" dirty="0">
+                <a:solidFill>
+                  <a:srgbClr val="ECECEC"/>
+                </a:solidFill>
+                <a:effectLst/>
+                <a:highlight>
+                  <a:srgbClr val="212121"/>
+                </a:highlight>
+                <a:latin typeface="Söhne"/>
+              </a:rPr>
+              <a:t>Algorithms</a:t>
+            </a:r>
+            <a:r>
+              <a:rPr lang="en-US" b="0" i="0" dirty="0">
+                <a:solidFill>
+                  <a:srgbClr val="ECECEC"/>
+                </a:solidFill>
+                <a:effectLst/>
+                <a:highlight>
+                  <a:srgbClr val="212121"/>
+                </a:highlight>
+                <a:latin typeface="Söhne"/>
+              </a:rPr>
+              <a:t>: This involves not just the RL algorithms but also potentially other algorithms for optimizing trading strategies and generating trading signals. </a:t>
+            </a:r>
+          </a:p>
+          <a:p>
+            <a:pPr marL="0" marR="0" lvl="0" indent="0" algn="l" defTabSz="914400" rtl="0" eaLnBrk="1" fontAlgn="auto" latinLnBrk="0" hangingPunct="1">
+              <a:lnSpc>
+                <a:spcPct val="100000"/>
+              </a:lnSpc>
+              <a:spcBef>
+                <a:spcPts val="0"/>
+              </a:spcBef>
+              <a:spcAft>
+                <a:spcPts val="0"/>
+              </a:spcAft>
+              <a:buClrTx/>
+              <a:buSzTx/>
+              <a:buFontTx/>
+              <a:buNone/>
+              <a:tabLst/>
+              <a:defRPr/>
+            </a:pPr>
+            <a:endParaRPr lang="en-US" b="0" i="0" dirty="0">
+              <a:solidFill>
+                <a:srgbClr val="ECECEC"/>
+              </a:solidFill>
+              <a:effectLst/>
+              <a:highlight>
+                <a:srgbClr val="212121"/>
+              </a:highlight>
+              <a:latin typeface="Söhne"/>
+            </a:endParaRPr>
+          </a:p>
+          <a:p>
+            <a:pPr marL="0" marR="0" lvl="0" indent="0" algn="l" defTabSz="914400" rtl="0" eaLnBrk="1" fontAlgn="auto" latinLnBrk="0" hangingPunct="1">
+              <a:lnSpc>
+                <a:spcPct val="100000"/>
+              </a:lnSpc>
+              <a:spcBef>
+                <a:spcPts val="0"/>
+              </a:spcBef>
+              <a:spcAft>
+                <a:spcPts val="0"/>
+              </a:spcAft>
+              <a:buClrTx/>
+              <a:buSzTx/>
+              <a:buFontTx/>
+              <a:buNone/>
+              <a:tabLst/>
+              <a:defRPr/>
+            </a:pPr>
+            <a:r>
+              <a:rPr lang="en-US" b="1" i="0" dirty="0">
+                <a:solidFill>
+                  <a:srgbClr val="ECECEC"/>
+                </a:solidFill>
+                <a:effectLst/>
+                <a:highlight>
+                  <a:srgbClr val="212121"/>
+                </a:highlight>
+                <a:latin typeface="Söhne"/>
+              </a:rPr>
+              <a:t>User Interface</a:t>
+            </a:r>
+            <a:r>
+              <a:rPr lang="en-US" b="0" i="0" dirty="0">
+                <a:solidFill>
+                  <a:srgbClr val="ECECEC"/>
+                </a:solidFill>
+                <a:effectLst/>
+                <a:highlight>
+                  <a:srgbClr val="212121"/>
+                </a:highlight>
+                <a:latin typeface="Söhne"/>
+              </a:rPr>
+              <a:t>: Through a dashboard, users can interact with the system, view visualizations of market data and model outputs, and receive decision support for trades. </a:t>
+            </a:r>
+          </a:p>
+          <a:p>
+            <a:pPr marL="0" marR="0" lvl="0" indent="0" algn="l" defTabSz="914400" rtl="0" eaLnBrk="1" fontAlgn="auto" latinLnBrk="0" hangingPunct="1">
+              <a:lnSpc>
+                <a:spcPct val="100000"/>
+              </a:lnSpc>
+              <a:spcBef>
+                <a:spcPts val="0"/>
+              </a:spcBef>
+              <a:spcAft>
+                <a:spcPts val="0"/>
+              </a:spcAft>
+              <a:buClrTx/>
+              <a:buSzTx/>
+              <a:buFontTx/>
+              <a:buNone/>
+              <a:tabLst/>
+              <a:defRPr/>
+            </a:pPr>
+            <a:endParaRPr lang="en-US" b="0" i="0" dirty="0">
+              <a:solidFill>
+                <a:srgbClr val="ECECEC"/>
+              </a:solidFill>
+              <a:effectLst/>
+              <a:highlight>
+                <a:srgbClr val="212121"/>
+              </a:highlight>
+              <a:latin typeface="Söhne"/>
+            </a:endParaRPr>
+          </a:p>
+          <a:p>
+            <a:pPr marL="0" marR="0" lvl="0" indent="0" algn="l" defTabSz="914400" rtl="0" eaLnBrk="1" fontAlgn="auto" latinLnBrk="0" hangingPunct="1">
+              <a:lnSpc>
+                <a:spcPct val="100000"/>
+              </a:lnSpc>
+              <a:spcBef>
+                <a:spcPts val="0"/>
+              </a:spcBef>
+              <a:spcAft>
+                <a:spcPts val="0"/>
+              </a:spcAft>
+              <a:buClrTx/>
+              <a:buSzTx/>
+              <a:buFontTx/>
+              <a:buNone/>
+              <a:tabLst/>
+              <a:defRPr/>
+            </a:pPr>
+            <a:endParaRPr lang="en-US" b="1" dirty="0"/>
+          </a:p>
+        </p:txBody>
+      </p:sp>
+      <p:sp>
+        <p:nvSpPr>
+          <p:cNvPr id="4" name="Slide Number Placeholder 3"/>
+          <p:cNvSpPr>
+            <a:spLocks noGrp="1"/>
+          </p:cNvSpPr>
+          <p:nvPr>
+            <p:ph type="sldNum" sz="quarter" idx="5"/>
+          </p:nvPr>
+        </p:nvSpPr>
+        <p:spPr/>
+        <p:txBody>
+          <a:bodyPr/>
+          <a:lstStyle/>
+          <a:p>
+            <a:fld id="{531D13CD-66F2-4CB3-ACBB-6CF6081D754D}" type="slidenum">
+              <a:rPr lang="en-US" smtClean="0"/>
+              <a:t>25</a:t>
+            </a:fld>
+            <a:endParaRPr lang="en-US"/>
+          </a:p>
+        </p:txBody>
+      </p:sp>
+    </p:spTree>
+    <p:extLst>
+      <p:ext uri="{BB962C8B-B14F-4D97-AF65-F5344CB8AC3E}">
+        <p14:creationId xmlns:p14="http://schemas.microsoft.com/office/powerpoint/2010/main" val="4275607231"/>
+      </p:ext>
+    </p:extLst>
+  </p:cSld>
+  <p:clrMapOvr>
+    <a:masterClrMapping/>
+  </p:clrMapOvr>
+</p:notes>
+</file>
+
 <file path=ppt/notesSlides/notesSlide2.xml><?xml version="1.0" encoding="utf-8"?>
 <p:notes xmlns:a="http://schemas.openxmlformats.org/drawingml/2006/main" xmlns:r="http://schemas.openxmlformats.org/officeDocument/2006/relationships" xmlns:p="http://schemas.openxmlformats.org/presentationml/2006/main">
   <p:cSld>
@@ -1147,6 +1666,1335 @@
     <p:extLst>
       <p:ext uri="{BB962C8B-B14F-4D97-AF65-F5344CB8AC3E}">
         <p14:creationId xmlns:p14="http://schemas.microsoft.com/office/powerpoint/2010/main" val="3950832161"/>
+      </p:ext>
+    </p:extLst>
+  </p:cSld>
+  <p:clrMapOvr>
+    <a:masterClrMapping/>
+  </p:clrMapOvr>
+</p:notes>
+</file>
+
+<file path=ppt/notesSlides/notesSlide5.xml><?xml version="1.0" encoding="utf-8"?>
+<p:notes xmlns:a="http://schemas.openxmlformats.org/drawingml/2006/main" xmlns:r="http://schemas.openxmlformats.org/officeDocument/2006/relationships" xmlns:p="http://schemas.openxmlformats.org/presentationml/2006/main">
+  <p:cSld>
+    <p:spTree>
+      <p:nvGrpSpPr>
+        <p:cNvPr id="1" name=""/>
+        <p:cNvGrpSpPr/>
+        <p:nvPr/>
+      </p:nvGrpSpPr>
+      <p:grpSpPr>
+        <a:xfrm>
+          <a:off x="0" y="0"/>
+          <a:ext cx="0" cy="0"/>
+          <a:chOff x="0" y="0"/>
+          <a:chExt cx="0" cy="0"/>
+        </a:xfrm>
+      </p:grpSpPr>
+      <p:sp>
+        <p:nvSpPr>
+          <p:cNvPr id="2" name="Slide Image Placeholder 1"/>
+          <p:cNvSpPr>
+            <a:spLocks noGrp="1" noRot="1" noChangeAspect="1"/>
+          </p:cNvSpPr>
+          <p:nvPr>
+            <p:ph type="sldImg"/>
+          </p:nvPr>
+        </p:nvSpPr>
+        <p:spPr/>
+      </p:sp>
+      <p:sp>
+        <p:nvSpPr>
+          <p:cNvPr id="3" name="Notes Placeholder 2"/>
+          <p:cNvSpPr>
+            <a:spLocks noGrp="1"/>
+          </p:cNvSpPr>
+          <p:nvPr>
+            <p:ph type="body" idx="1"/>
+          </p:nvPr>
+        </p:nvSpPr>
+        <p:spPr/>
+        <p:txBody>
+          <a:bodyPr/>
+          <a:lstStyle/>
+          <a:p>
+            <a:pPr marL="0" marR="0">
+              <a:lnSpc>
+                <a:spcPct val="115000"/>
+              </a:lnSpc>
+              <a:spcBef>
+                <a:spcPts val="0"/>
+              </a:spcBef>
+              <a:spcAft>
+                <a:spcPts val="800"/>
+              </a:spcAft>
+            </a:pPr>
+            <a:r>
+              <a:rPr lang="en-US" sz="1200" kern="100" dirty="0">
+                <a:solidFill>
+                  <a:srgbClr val="ECECEC"/>
+                </a:solidFill>
+                <a:effectLst/>
+                <a:highlight>
+                  <a:srgbClr val="212121"/>
+                </a:highlight>
+                <a:latin typeface="Segoe UI" panose="020B0502040204020203" pitchFamily="34" charset="0"/>
+                <a:ea typeface="Yu Mincho" panose="02020400000000000000" pitchFamily="18" charset="-128"/>
+                <a:cs typeface="Times New Roman" panose="02020603050405020304" pitchFamily="18" charset="0"/>
+              </a:rPr>
+              <a:t>The project aims to tackle the challenges of forecasting stock market returns in the complex and volatile environment of the DJI. Recognizing the limitations of traditional trading models in capturing the multifaceted dynamics of financial markets, the research seeks to employ Reinforcement Learning (RL) </a:t>
+            </a:r>
+            <a:endParaRPr lang="en-US" sz="1200" kern="100" dirty="0">
+              <a:effectLst/>
+              <a:latin typeface="Aptos" panose="020B0004020202020204" pitchFamily="34" charset="0"/>
+              <a:ea typeface="Yu Mincho" panose="02020400000000000000" pitchFamily="18" charset="-128"/>
+              <a:cs typeface="Times New Roman" panose="02020603050405020304" pitchFamily="18" charset="0"/>
+            </a:endParaRPr>
+          </a:p>
+          <a:p>
+            <a:pPr marL="0" marR="0">
+              <a:lnSpc>
+                <a:spcPct val="115000"/>
+              </a:lnSpc>
+              <a:spcBef>
+                <a:spcPts val="0"/>
+              </a:spcBef>
+              <a:spcAft>
+                <a:spcPts val="800"/>
+              </a:spcAft>
+            </a:pPr>
+            <a:r>
+              <a:rPr lang="en-US" sz="1200" kern="100" dirty="0">
+                <a:solidFill>
+                  <a:srgbClr val="ECECEC"/>
+                </a:solidFill>
+                <a:effectLst/>
+                <a:highlight>
+                  <a:srgbClr val="212121"/>
+                </a:highlight>
+                <a:latin typeface="Segoe UI" panose="020B0502040204020203" pitchFamily="34" charset="0"/>
+                <a:ea typeface="Yu Mincho" panose="02020400000000000000" pitchFamily="18" charset="-128"/>
+                <a:cs typeface="Times New Roman" panose="02020603050405020304" pitchFamily="18" charset="0"/>
+              </a:rPr>
+              <a:t> RL’s capacity to learn and adapt through interaction with an environment makes it suitable for understanding and anticipating market behavior, which is influenced by economic indicators, geopolitical events, and rapid technological advances.</a:t>
+            </a:r>
+            <a:r>
+              <a:rPr lang="en-US" sz="1200" kern="100" dirty="0">
+                <a:solidFill>
+                  <a:schemeClr val="tx1"/>
+                </a:solidFill>
+                <a:effectLst/>
+                <a:highlight>
+                  <a:srgbClr val="212121"/>
+                </a:highlight>
+                <a:latin typeface="Aptos" panose="020B0004020202020204" pitchFamily="34" charset="0"/>
+                <a:ea typeface="Yu Mincho" panose="02020400000000000000" pitchFamily="18" charset="-128"/>
+                <a:cs typeface="Times New Roman" panose="02020603050405020304" pitchFamily="18" charset="0"/>
+              </a:rPr>
+              <a:t> </a:t>
+            </a:r>
+            <a:r>
+              <a:rPr lang="en-US" sz="1200" kern="100" dirty="0">
+                <a:solidFill>
+                  <a:srgbClr val="ECECEC"/>
+                </a:solidFill>
+                <a:effectLst/>
+                <a:highlight>
+                  <a:srgbClr val="212121"/>
+                </a:highlight>
+                <a:latin typeface="Segoe UI" panose="020B0502040204020203" pitchFamily="34" charset="0"/>
+                <a:ea typeface="Yu Mincho" panose="02020400000000000000" pitchFamily="18" charset="-128"/>
+                <a:cs typeface="Times New Roman" panose="02020603050405020304" pitchFamily="18" charset="0"/>
+              </a:rPr>
+              <a:t>Over time, the RL agent would refine its trading strategy to maximize the cumulative reward</a:t>
+            </a:r>
+            <a:endParaRPr lang="en-US" sz="1200" kern="100" dirty="0">
+              <a:effectLst/>
+              <a:latin typeface="Aptos" panose="020B0004020202020204" pitchFamily="34" charset="0"/>
+              <a:ea typeface="Yu Mincho" panose="02020400000000000000" pitchFamily="18" charset="-128"/>
+              <a:cs typeface="Times New Roman" panose="02020603050405020304" pitchFamily="18" charset="0"/>
+            </a:endParaRPr>
+          </a:p>
+          <a:p>
+            <a:endParaRPr lang="en-US" dirty="0"/>
+          </a:p>
+          <a:p>
+            <a:endParaRPr lang="en-US" dirty="0"/>
+          </a:p>
+          <a:p>
+            <a:pPr marL="342900" marR="0" lvl="0" indent="-342900">
+              <a:spcBef>
+                <a:spcPts val="0"/>
+              </a:spcBef>
+              <a:spcAft>
+                <a:spcPts val="0"/>
+              </a:spcAft>
+              <a:tabLst>
+                <a:tab pos="457200" algn="l"/>
+              </a:tabLst>
+            </a:pPr>
+            <a:r>
+              <a:rPr lang="en-US" sz="1800" dirty="0">
+                <a:solidFill>
+                  <a:srgbClr val="ECECEC"/>
+                </a:solidFill>
+                <a:effectLst/>
+                <a:highlight>
+                  <a:srgbClr val="212121"/>
+                </a:highlight>
+                <a:latin typeface="Segoe UI" panose="020B0502040204020203" pitchFamily="34" charset="0"/>
+                <a:ea typeface="Times New Roman" panose="02020603050405020304" pitchFamily="18" charset="0"/>
+              </a:rPr>
+              <a:t>The RL agent would ingest market data, which may include price, volume, and possibly technical indicators or sentiment analysis from news articles. It would use this data to understand the current state of the market.</a:t>
+            </a:r>
+            <a:endParaRPr lang="en-US" sz="1800" dirty="0">
+              <a:effectLst/>
+              <a:highlight>
+                <a:srgbClr val="212121"/>
+              </a:highlight>
+              <a:latin typeface="Times New Roman" panose="02020603050405020304" pitchFamily="18" charset="0"/>
+              <a:ea typeface="Times New Roman" panose="02020603050405020304" pitchFamily="18" charset="0"/>
+            </a:endParaRPr>
+          </a:p>
+          <a:p>
+            <a:pPr marL="342900" marR="0" lvl="0" indent="-342900">
+              <a:spcBef>
+                <a:spcPts val="0"/>
+              </a:spcBef>
+              <a:spcAft>
+                <a:spcPts val="0"/>
+              </a:spcAft>
+              <a:tabLst>
+                <a:tab pos="457200" algn="l"/>
+              </a:tabLst>
+            </a:pPr>
+            <a:r>
+              <a:rPr lang="en-US" sz="1800" dirty="0">
+                <a:solidFill>
+                  <a:srgbClr val="ECECEC"/>
+                </a:solidFill>
+                <a:effectLst/>
+                <a:highlight>
+                  <a:srgbClr val="212121"/>
+                </a:highlight>
+                <a:latin typeface="Segoe UI" panose="020B0502040204020203" pitchFamily="34" charset="0"/>
+                <a:ea typeface="Times New Roman" panose="02020603050405020304" pitchFamily="18" charset="0"/>
+              </a:rPr>
+              <a:t>Based on its analysis and the state it has constructed from the data, the RL agent would make trading decisions, such as whether to buy, sell, or hold a particular stock.</a:t>
+            </a:r>
+            <a:endParaRPr lang="en-US" sz="1800" dirty="0">
+              <a:effectLst/>
+              <a:highlight>
+                <a:srgbClr val="212121"/>
+              </a:highlight>
+              <a:latin typeface="Times New Roman" panose="02020603050405020304" pitchFamily="18" charset="0"/>
+              <a:ea typeface="Times New Roman" panose="02020603050405020304" pitchFamily="18" charset="0"/>
+            </a:endParaRPr>
+          </a:p>
+          <a:p>
+            <a:pPr marL="0" marR="0">
+              <a:lnSpc>
+                <a:spcPct val="115000"/>
+              </a:lnSpc>
+              <a:spcBef>
+                <a:spcPts val="0"/>
+              </a:spcBef>
+              <a:spcAft>
+                <a:spcPts val="800"/>
+              </a:spcAft>
+            </a:pPr>
+            <a:r>
+              <a:rPr lang="en-US" sz="1800" kern="100" dirty="0">
+                <a:solidFill>
+                  <a:srgbClr val="ECECEC"/>
+                </a:solidFill>
+                <a:effectLst/>
+                <a:highlight>
+                  <a:srgbClr val="212121"/>
+                </a:highlight>
+                <a:latin typeface="Segoe UI" panose="020B0502040204020203" pitchFamily="34" charset="0"/>
+                <a:ea typeface="Yu Mincho" panose="02020400000000000000" pitchFamily="18" charset="-128"/>
+                <a:cs typeface="Times New Roman" panose="02020603050405020304" pitchFamily="18" charset="0"/>
+              </a:rPr>
+              <a:t>The RL agent would utilize a reward function to evaluate the effectiveness of its actions</a:t>
+            </a:r>
+            <a:endParaRPr lang="en-US" sz="1800" kern="100" dirty="0">
+              <a:effectLst/>
+              <a:latin typeface="Aptos" panose="020B0004020202020204" pitchFamily="34" charset="0"/>
+              <a:ea typeface="Yu Mincho" panose="02020400000000000000" pitchFamily="18" charset="-128"/>
+              <a:cs typeface="Times New Roman" panose="02020603050405020304" pitchFamily="18" charset="0"/>
+            </a:endParaRPr>
+          </a:p>
+          <a:p>
+            <a:endParaRPr lang="en-US" dirty="0"/>
+          </a:p>
+          <a:p>
+            <a:pPr marL="0" marR="0" lvl="0" indent="0">
+              <a:lnSpc>
+                <a:spcPct val="115000"/>
+              </a:lnSpc>
+              <a:spcBef>
+                <a:spcPts val="0"/>
+              </a:spcBef>
+              <a:spcAft>
+                <a:spcPts val="0"/>
+              </a:spcAft>
+              <a:buFont typeface="Aptos" panose="020B0004020202020204" pitchFamily="34" charset="0"/>
+              <a:buNone/>
+            </a:pPr>
+            <a:r>
+              <a:rPr lang="en-US" sz="1800" b="1" kern="0" dirty="0">
+                <a:solidFill>
+                  <a:srgbClr val="ECECEC"/>
+                </a:solidFill>
+                <a:effectLst/>
+                <a:highlight>
+                  <a:srgbClr val="212121"/>
+                </a:highlight>
+                <a:latin typeface="Segoe UI" panose="020B0502040204020203" pitchFamily="34" charset="0"/>
+                <a:ea typeface="Times New Roman" panose="02020603050405020304" pitchFamily="18" charset="0"/>
+                <a:cs typeface="Times New Roman" panose="02020603050405020304" pitchFamily="18" charset="0"/>
+              </a:rPr>
+              <a:t>- Enhanced Forecasting</a:t>
+            </a:r>
+            <a:r>
+              <a:rPr lang="en-US" sz="1800" kern="0" dirty="0">
+                <a:solidFill>
+                  <a:srgbClr val="ECECEC"/>
+                </a:solidFill>
+                <a:effectLst/>
+                <a:highlight>
+                  <a:srgbClr val="212121"/>
+                </a:highlight>
+                <a:latin typeface="Segoe UI" panose="020B0502040204020203" pitchFamily="34" charset="0"/>
+                <a:ea typeface="Times New Roman" panose="02020603050405020304" pitchFamily="18" charset="0"/>
+                <a:cs typeface="Times New Roman" panose="02020603050405020304" pitchFamily="18" charset="0"/>
+              </a:rPr>
+              <a:t>: To provide a more sophisticated tool for predicting stock market returns that can handle the complexities and volatile nature of modern financial markets.</a:t>
+            </a:r>
+            <a:endParaRPr lang="en-US" sz="1800" kern="100" dirty="0">
+              <a:effectLst/>
+              <a:latin typeface="Aptos" panose="020B0004020202020204" pitchFamily="34" charset="0"/>
+              <a:ea typeface="Yu Mincho" panose="02020400000000000000" pitchFamily="18" charset="-128"/>
+              <a:cs typeface="Times New Roman" panose="02020603050405020304" pitchFamily="18" charset="0"/>
+            </a:endParaRPr>
+          </a:p>
+          <a:p>
+            <a:pPr marL="0" marR="0" lvl="0" indent="0">
+              <a:lnSpc>
+                <a:spcPct val="115000"/>
+              </a:lnSpc>
+              <a:spcBef>
+                <a:spcPts val="0"/>
+              </a:spcBef>
+              <a:spcAft>
+                <a:spcPts val="0"/>
+              </a:spcAft>
+              <a:buSzPts val="1000"/>
+              <a:buFont typeface="Symbol" panose="05050102010706020507" pitchFamily="18" charset="2"/>
+              <a:buNone/>
+              <a:tabLst>
+                <a:tab pos="457200" algn="l"/>
+              </a:tabLst>
+            </a:pPr>
+            <a:r>
+              <a:rPr lang="en-US" sz="1800" b="1" kern="0" dirty="0">
+                <a:solidFill>
+                  <a:srgbClr val="ECECEC"/>
+                </a:solidFill>
+                <a:effectLst/>
+                <a:highlight>
+                  <a:srgbClr val="212121"/>
+                </a:highlight>
+                <a:latin typeface="Segoe UI" panose="020B0502040204020203" pitchFamily="34" charset="0"/>
+                <a:ea typeface="Times New Roman" panose="02020603050405020304" pitchFamily="18" charset="0"/>
+                <a:cs typeface="Times New Roman" panose="02020603050405020304" pitchFamily="18" charset="0"/>
+              </a:rPr>
+              <a:t>- Informed Trading Decisions</a:t>
+            </a:r>
+            <a:r>
+              <a:rPr lang="en-US" sz="1800" kern="0" dirty="0">
+                <a:solidFill>
+                  <a:srgbClr val="ECECEC"/>
+                </a:solidFill>
+                <a:effectLst/>
+                <a:highlight>
+                  <a:srgbClr val="212121"/>
+                </a:highlight>
+                <a:latin typeface="Segoe UI" panose="020B0502040204020203" pitchFamily="34" charset="0"/>
+                <a:ea typeface="Times New Roman" panose="02020603050405020304" pitchFamily="18" charset="0"/>
+                <a:cs typeface="Times New Roman" panose="02020603050405020304" pitchFamily="18" charset="0"/>
+              </a:rPr>
+              <a:t>: To enable investors to make more informed decisions by employing adaptive trading methods that respond to real-time market conditions.</a:t>
+            </a:r>
+            <a:endParaRPr lang="en-US" sz="1800" kern="100" dirty="0">
+              <a:solidFill>
+                <a:srgbClr val="ECECEC"/>
+              </a:solidFill>
+              <a:effectLst/>
+              <a:highlight>
+                <a:srgbClr val="212121"/>
+              </a:highlight>
+              <a:latin typeface="Aptos" panose="020B0004020202020204" pitchFamily="34" charset="0"/>
+              <a:ea typeface="Yu Mincho" panose="02020400000000000000" pitchFamily="18" charset="-128"/>
+              <a:cs typeface="Times New Roman" panose="02020603050405020304" pitchFamily="18" charset="0"/>
+            </a:endParaRPr>
+          </a:p>
+          <a:p>
+            <a:pPr marL="0" marR="0" lvl="0" indent="0">
+              <a:lnSpc>
+                <a:spcPct val="115000"/>
+              </a:lnSpc>
+              <a:spcBef>
+                <a:spcPts val="0"/>
+              </a:spcBef>
+              <a:spcAft>
+                <a:spcPts val="0"/>
+              </a:spcAft>
+              <a:buSzPts val="1000"/>
+              <a:buFont typeface="Symbol" panose="05050102010706020507" pitchFamily="18" charset="2"/>
+              <a:buNone/>
+              <a:tabLst>
+                <a:tab pos="457200" algn="l"/>
+              </a:tabLst>
+            </a:pPr>
+            <a:r>
+              <a:rPr lang="en-US" sz="1800" b="1" kern="0" dirty="0">
+                <a:solidFill>
+                  <a:srgbClr val="ECECEC"/>
+                </a:solidFill>
+                <a:effectLst/>
+                <a:highlight>
+                  <a:srgbClr val="212121"/>
+                </a:highlight>
+                <a:latin typeface="Segoe UI" panose="020B0502040204020203" pitchFamily="34" charset="0"/>
+                <a:ea typeface="Times New Roman" panose="02020603050405020304" pitchFamily="18" charset="0"/>
+                <a:cs typeface="Times New Roman" panose="02020603050405020304" pitchFamily="18" charset="0"/>
+              </a:rPr>
+              <a:t>- Increased Profitability</a:t>
+            </a:r>
+            <a:r>
+              <a:rPr lang="en-US" sz="1800" kern="0" dirty="0">
+                <a:solidFill>
+                  <a:srgbClr val="ECECEC"/>
+                </a:solidFill>
+                <a:effectLst/>
+                <a:highlight>
+                  <a:srgbClr val="212121"/>
+                </a:highlight>
+                <a:latin typeface="Segoe UI" panose="020B0502040204020203" pitchFamily="34" charset="0"/>
+                <a:ea typeface="Times New Roman" panose="02020603050405020304" pitchFamily="18" charset="0"/>
+                <a:cs typeface="Times New Roman" panose="02020603050405020304" pitchFamily="18" charset="0"/>
+              </a:rPr>
+              <a:t>: To aid investors and financial institutions in improving their profitability and portfolio management through optimized trading strategies.</a:t>
+            </a:r>
+            <a:endParaRPr lang="en-US" sz="1800" kern="100" dirty="0">
+              <a:solidFill>
+                <a:srgbClr val="ECECEC"/>
+              </a:solidFill>
+              <a:effectLst/>
+              <a:highlight>
+                <a:srgbClr val="212121"/>
+              </a:highlight>
+              <a:latin typeface="Aptos" panose="020B0004020202020204" pitchFamily="34" charset="0"/>
+              <a:ea typeface="Yu Mincho" panose="02020400000000000000" pitchFamily="18" charset="-128"/>
+              <a:cs typeface="Times New Roman" panose="02020603050405020304" pitchFamily="18" charset="0"/>
+            </a:endParaRPr>
+          </a:p>
+          <a:p>
+            <a:endParaRPr lang="en-US" dirty="0"/>
+          </a:p>
+        </p:txBody>
+      </p:sp>
+      <p:sp>
+        <p:nvSpPr>
+          <p:cNvPr id="4" name="Slide Number Placeholder 3"/>
+          <p:cNvSpPr>
+            <a:spLocks noGrp="1"/>
+          </p:cNvSpPr>
+          <p:nvPr>
+            <p:ph type="sldNum" sz="quarter" idx="5"/>
+          </p:nvPr>
+        </p:nvSpPr>
+        <p:spPr/>
+        <p:txBody>
+          <a:bodyPr/>
+          <a:lstStyle/>
+          <a:p>
+            <a:fld id="{531D13CD-66F2-4CB3-ACBB-6CF6081D754D}" type="slidenum">
+              <a:rPr lang="en-US" smtClean="0"/>
+              <a:t>16</a:t>
+            </a:fld>
+            <a:endParaRPr lang="en-US"/>
+          </a:p>
+        </p:txBody>
+      </p:sp>
+    </p:spTree>
+    <p:extLst>
+      <p:ext uri="{BB962C8B-B14F-4D97-AF65-F5344CB8AC3E}">
+        <p14:creationId xmlns:p14="http://schemas.microsoft.com/office/powerpoint/2010/main" val="312294651"/>
+      </p:ext>
+    </p:extLst>
+  </p:cSld>
+  <p:clrMapOvr>
+    <a:masterClrMapping/>
+  </p:clrMapOvr>
+</p:notes>
+</file>
+
+<file path=ppt/notesSlides/notesSlide6.xml><?xml version="1.0" encoding="utf-8"?>
+<p:notes xmlns:a="http://schemas.openxmlformats.org/drawingml/2006/main" xmlns:r="http://schemas.openxmlformats.org/officeDocument/2006/relationships" xmlns:p="http://schemas.openxmlformats.org/presentationml/2006/main">
+  <p:cSld>
+    <p:spTree>
+      <p:nvGrpSpPr>
+        <p:cNvPr id="1" name=""/>
+        <p:cNvGrpSpPr/>
+        <p:nvPr/>
+      </p:nvGrpSpPr>
+      <p:grpSpPr>
+        <a:xfrm>
+          <a:off x="0" y="0"/>
+          <a:ext cx="0" cy="0"/>
+          <a:chOff x="0" y="0"/>
+          <a:chExt cx="0" cy="0"/>
+        </a:xfrm>
+      </p:grpSpPr>
+      <p:sp>
+        <p:nvSpPr>
+          <p:cNvPr id="2" name="Slide Image Placeholder 1"/>
+          <p:cNvSpPr>
+            <a:spLocks noGrp="1" noRot="1" noChangeAspect="1"/>
+          </p:cNvSpPr>
+          <p:nvPr>
+            <p:ph type="sldImg"/>
+          </p:nvPr>
+        </p:nvSpPr>
+        <p:spPr/>
+      </p:sp>
+      <p:sp>
+        <p:nvSpPr>
+          <p:cNvPr id="3" name="Notes Placeholder 2"/>
+          <p:cNvSpPr>
+            <a:spLocks noGrp="1"/>
+          </p:cNvSpPr>
+          <p:nvPr>
+            <p:ph type="body" idx="1"/>
+          </p:nvPr>
+        </p:nvSpPr>
+        <p:spPr/>
+        <p:txBody>
+          <a:bodyPr/>
+          <a:lstStyle/>
+          <a:p>
+            <a:endParaRPr lang="en-US" dirty="0"/>
+          </a:p>
+        </p:txBody>
+      </p:sp>
+      <p:sp>
+        <p:nvSpPr>
+          <p:cNvPr id="4" name="Slide Number Placeholder 3"/>
+          <p:cNvSpPr>
+            <a:spLocks noGrp="1"/>
+          </p:cNvSpPr>
+          <p:nvPr>
+            <p:ph type="sldNum" sz="quarter" idx="5"/>
+          </p:nvPr>
+        </p:nvSpPr>
+        <p:spPr/>
+        <p:txBody>
+          <a:bodyPr/>
+          <a:lstStyle/>
+          <a:p>
+            <a:fld id="{531D13CD-66F2-4CB3-ACBB-6CF6081D754D}" type="slidenum">
+              <a:rPr lang="en-US" smtClean="0"/>
+              <a:t>17</a:t>
+            </a:fld>
+            <a:endParaRPr lang="en-US"/>
+          </a:p>
+        </p:txBody>
+      </p:sp>
+    </p:spTree>
+    <p:extLst>
+      <p:ext uri="{BB962C8B-B14F-4D97-AF65-F5344CB8AC3E}">
+        <p14:creationId xmlns:p14="http://schemas.microsoft.com/office/powerpoint/2010/main" val="1589188772"/>
+      </p:ext>
+    </p:extLst>
+  </p:cSld>
+  <p:clrMapOvr>
+    <a:masterClrMapping/>
+  </p:clrMapOvr>
+</p:notes>
+</file>
+
+<file path=ppt/notesSlides/notesSlide7.xml><?xml version="1.0" encoding="utf-8"?>
+<p:notes xmlns:a="http://schemas.openxmlformats.org/drawingml/2006/main" xmlns:r="http://schemas.openxmlformats.org/officeDocument/2006/relationships" xmlns:p="http://schemas.openxmlformats.org/presentationml/2006/main">
+  <p:cSld>
+    <p:spTree>
+      <p:nvGrpSpPr>
+        <p:cNvPr id="1" name=""/>
+        <p:cNvGrpSpPr/>
+        <p:nvPr/>
+      </p:nvGrpSpPr>
+      <p:grpSpPr>
+        <a:xfrm>
+          <a:off x="0" y="0"/>
+          <a:ext cx="0" cy="0"/>
+          <a:chOff x="0" y="0"/>
+          <a:chExt cx="0" cy="0"/>
+        </a:xfrm>
+      </p:grpSpPr>
+      <p:sp>
+        <p:nvSpPr>
+          <p:cNvPr id="2" name="Slide Image Placeholder 1"/>
+          <p:cNvSpPr>
+            <a:spLocks noGrp="1" noRot="1" noChangeAspect="1"/>
+          </p:cNvSpPr>
+          <p:nvPr>
+            <p:ph type="sldImg"/>
+          </p:nvPr>
+        </p:nvSpPr>
+        <p:spPr/>
+      </p:sp>
+      <p:sp>
+        <p:nvSpPr>
+          <p:cNvPr id="3" name="Notes Placeholder 2"/>
+          <p:cNvSpPr>
+            <a:spLocks noGrp="1"/>
+          </p:cNvSpPr>
+          <p:nvPr>
+            <p:ph type="body" idx="1"/>
+          </p:nvPr>
+        </p:nvSpPr>
+        <p:spPr/>
+        <p:txBody>
+          <a:bodyPr/>
+          <a:lstStyle/>
+          <a:p>
+            <a:pPr algn="l">
+              <a:buFont typeface="Arial" panose="020B0604020202020204" pitchFamily="34" charset="0"/>
+              <a:buChar char="•"/>
+            </a:pPr>
+            <a:r>
+              <a:rPr lang="en-US" b="1" i="0" dirty="0">
+                <a:solidFill>
+                  <a:srgbClr val="ECECEC"/>
+                </a:solidFill>
+                <a:effectLst/>
+                <a:highlight>
+                  <a:srgbClr val="212121"/>
+                </a:highlight>
+                <a:latin typeface="Söhne"/>
+              </a:rPr>
+              <a:t>Machine/Deep Learning</a:t>
+            </a:r>
+            <a:r>
+              <a:rPr lang="en-US" b="0" i="0" dirty="0">
+                <a:solidFill>
+                  <a:srgbClr val="ECECEC"/>
+                </a:solidFill>
+                <a:effectLst/>
+                <a:highlight>
+                  <a:srgbClr val="212121"/>
+                </a:highlight>
+                <a:latin typeface="Söhne"/>
+              </a:rPr>
+              <a:t>:</a:t>
+            </a:r>
+          </a:p>
+          <a:p>
+            <a:pPr marL="742950" lvl="1" indent="-285750" algn="l">
+              <a:buFont typeface="Arial" panose="020B0604020202020204" pitchFamily="34" charset="0"/>
+              <a:buChar char="•"/>
+            </a:pPr>
+            <a:r>
+              <a:rPr lang="en-US" b="0" i="0" dirty="0">
+                <a:solidFill>
+                  <a:srgbClr val="ECECEC"/>
+                </a:solidFill>
+                <a:effectLst/>
+                <a:highlight>
+                  <a:srgbClr val="212121"/>
+                </a:highlight>
+                <a:latin typeface="Söhne"/>
+              </a:rPr>
+              <a:t>Utilizes advanced algorithms for predictive modeling.</a:t>
+            </a:r>
+          </a:p>
+          <a:p>
+            <a:pPr marL="742950" lvl="1" indent="-285750" algn="l">
+              <a:buFont typeface="Arial" panose="020B0604020202020204" pitchFamily="34" charset="0"/>
+              <a:buChar char="•"/>
+            </a:pPr>
+            <a:r>
+              <a:rPr lang="en-US" b="0" i="0" dirty="0">
+                <a:solidFill>
+                  <a:srgbClr val="ECECEC"/>
+                </a:solidFill>
+                <a:effectLst/>
+                <a:highlight>
+                  <a:srgbClr val="212121"/>
+                </a:highlight>
+                <a:latin typeface="Söhne"/>
+              </a:rPr>
+              <a:t>Adapts to market dynamics and learns from new data.</a:t>
+            </a:r>
+          </a:p>
+          <a:p>
+            <a:pPr marL="742950" lvl="1" indent="-285750" algn="l">
+              <a:buFont typeface="Arial" panose="020B0604020202020204" pitchFamily="34" charset="0"/>
+              <a:buChar char="•"/>
+            </a:pPr>
+            <a:r>
+              <a:rPr lang="en-US" b="0" i="0" dirty="0">
+                <a:solidFill>
+                  <a:srgbClr val="ECECEC"/>
+                </a:solidFill>
+                <a:effectLst/>
+                <a:highlight>
+                  <a:srgbClr val="212121"/>
+                </a:highlight>
+                <a:latin typeface="Söhne"/>
+              </a:rPr>
+              <a:t>Continuous improvement of models for better accuracy.</a:t>
+            </a:r>
+          </a:p>
+          <a:p>
+            <a:pPr algn="l">
+              <a:buFont typeface="Arial" panose="020B0604020202020204" pitchFamily="34" charset="0"/>
+              <a:buChar char="•"/>
+            </a:pPr>
+            <a:r>
+              <a:rPr lang="en-US" b="1" i="0" dirty="0">
+                <a:solidFill>
+                  <a:srgbClr val="ECECEC"/>
+                </a:solidFill>
+                <a:effectLst/>
+                <a:highlight>
+                  <a:srgbClr val="212121"/>
+                </a:highlight>
+                <a:latin typeface="Söhne"/>
+              </a:rPr>
+              <a:t>RL Agent</a:t>
+            </a:r>
+            <a:r>
+              <a:rPr lang="en-US" b="0" i="0" dirty="0">
+                <a:solidFill>
+                  <a:srgbClr val="ECECEC"/>
+                </a:solidFill>
+                <a:effectLst/>
+                <a:highlight>
+                  <a:srgbClr val="212121"/>
+                </a:highlight>
+                <a:latin typeface="Söhne"/>
+              </a:rPr>
+              <a:t>:</a:t>
+            </a:r>
+          </a:p>
+          <a:p>
+            <a:pPr marL="742950" lvl="1" indent="-285750" algn="l">
+              <a:buFont typeface="Arial" panose="020B0604020202020204" pitchFamily="34" charset="0"/>
+              <a:buChar char="•"/>
+            </a:pPr>
+            <a:r>
+              <a:rPr lang="en-US" b="0" i="0" dirty="0">
+                <a:solidFill>
+                  <a:srgbClr val="ECECEC"/>
+                </a:solidFill>
+                <a:effectLst/>
+                <a:highlight>
+                  <a:srgbClr val="212121"/>
+                </a:highlight>
+                <a:latin typeface="Söhne"/>
+              </a:rPr>
+              <a:t>Processes historical and real-time data to make data-driven trading decisions.</a:t>
+            </a:r>
+          </a:p>
+          <a:p>
+            <a:pPr marL="742950" lvl="1" indent="-285750" algn="l">
+              <a:buFont typeface="Arial" panose="020B0604020202020204" pitchFamily="34" charset="0"/>
+              <a:buChar char="•"/>
+            </a:pPr>
+            <a:r>
+              <a:rPr lang="en-US" b="0" i="0" dirty="0">
+                <a:solidFill>
+                  <a:srgbClr val="ECECEC"/>
+                </a:solidFill>
+                <a:effectLst/>
+                <a:highlight>
+                  <a:srgbClr val="212121"/>
+                </a:highlight>
+                <a:latin typeface="Söhne"/>
+              </a:rPr>
+              <a:t>Learns optimal actions by maximizing the reward function.</a:t>
+            </a:r>
+          </a:p>
+          <a:p>
+            <a:pPr marL="742950" lvl="1" indent="-285750" algn="l">
+              <a:buFont typeface="Arial" panose="020B0604020202020204" pitchFamily="34" charset="0"/>
+              <a:buChar char="•"/>
+            </a:pPr>
+            <a:r>
+              <a:rPr lang="en-US" b="0" i="0" dirty="0">
+                <a:solidFill>
+                  <a:srgbClr val="ECECEC"/>
+                </a:solidFill>
+                <a:effectLst/>
+                <a:highlight>
+                  <a:srgbClr val="212121"/>
+                </a:highlight>
+                <a:latin typeface="Söhne"/>
+              </a:rPr>
+              <a:t>Simulates various trading strategies to identify the most effective ones.</a:t>
+            </a:r>
+          </a:p>
+          <a:p>
+            <a:pPr algn="l">
+              <a:buFont typeface="Arial" panose="020B0604020202020204" pitchFamily="34" charset="0"/>
+              <a:buChar char="•"/>
+            </a:pPr>
+            <a:r>
+              <a:rPr lang="en-US" b="1" i="0" dirty="0">
+                <a:solidFill>
+                  <a:srgbClr val="ECECEC"/>
+                </a:solidFill>
+                <a:effectLst/>
+                <a:highlight>
+                  <a:srgbClr val="212121"/>
+                </a:highlight>
+                <a:latin typeface="Söhne"/>
+              </a:rPr>
+              <a:t>Algorithms</a:t>
+            </a:r>
+            <a:r>
+              <a:rPr lang="en-US" b="0" i="0" dirty="0">
+                <a:solidFill>
+                  <a:srgbClr val="ECECEC"/>
+                </a:solidFill>
+                <a:effectLst/>
+                <a:highlight>
+                  <a:srgbClr val="212121"/>
+                </a:highlight>
+                <a:latin typeface="Söhne"/>
+              </a:rPr>
+              <a:t>:</a:t>
+            </a:r>
+          </a:p>
+          <a:p>
+            <a:pPr marL="742950" lvl="1" indent="-285750" algn="l">
+              <a:buFont typeface="Arial" panose="020B0604020202020204" pitchFamily="34" charset="0"/>
+              <a:buChar char="•"/>
+            </a:pPr>
+            <a:r>
+              <a:rPr lang="en-US" b="0" i="0" dirty="0">
+                <a:solidFill>
+                  <a:srgbClr val="ECECEC"/>
+                </a:solidFill>
+                <a:effectLst/>
+                <a:highlight>
+                  <a:srgbClr val="212121"/>
+                </a:highlight>
+                <a:latin typeface="Söhne"/>
+              </a:rPr>
+              <a:t>Optimization of trading strategies based on machine learning insights.</a:t>
+            </a:r>
+          </a:p>
+          <a:p>
+            <a:pPr marL="742950" lvl="1" indent="-285750" algn="l">
+              <a:buFont typeface="Arial" panose="020B0604020202020204" pitchFamily="34" charset="0"/>
+              <a:buChar char="•"/>
+            </a:pPr>
+            <a:r>
+              <a:rPr lang="en-US" b="0" i="0" dirty="0">
+                <a:solidFill>
+                  <a:srgbClr val="ECECEC"/>
+                </a:solidFill>
+                <a:effectLst/>
+                <a:highlight>
+                  <a:srgbClr val="212121"/>
+                </a:highlight>
+                <a:latin typeface="Söhne"/>
+              </a:rPr>
+              <a:t>Designing trading signals that capture market opportunities.</a:t>
+            </a:r>
+          </a:p>
+          <a:p>
+            <a:pPr marL="742950" lvl="1" indent="-285750" algn="l">
+              <a:buFont typeface="Arial" panose="020B0604020202020204" pitchFamily="34" charset="0"/>
+              <a:buChar char="•"/>
+            </a:pPr>
+            <a:r>
+              <a:rPr lang="en-US" b="0" i="0" dirty="0">
+                <a:solidFill>
+                  <a:srgbClr val="ECECEC"/>
+                </a:solidFill>
+                <a:effectLst/>
+                <a:highlight>
+                  <a:srgbClr val="212121"/>
+                </a:highlight>
+                <a:latin typeface="Söhne"/>
+              </a:rPr>
+              <a:t>Rigorous </a:t>
+            </a:r>
+            <a:r>
+              <a:rPr lang="en-US" b="0" i="0" dirty="0" err="1">
+                <a:solidFill>
+                  <a:srgbClr val="ECECEC"/>
+                </a:solidFill>
+                <a:effectLst/>
+                <a:highlight>
+                  <a:srgbClr val="212121"/>
+                </a:highlight>
+                <a:latin typeface="Söhne"/>
+              </a:rPr>
+              <a:t>backtesting</a:t>
+            </a:r>
+            <a:r>
+              <a:rPr lang="en-US" b="0" i="0" dirty="0">
+                <a:solidFill>
+                  <a:srgbClr val="ECECEC"/>
+                </a:solidFill>
+                <a:effectLst/>
+                <a:highlight>
+                  <a:srgbClr val="212121"/>
+                </a:highlight>
+                <a:latin typeface="Söhne"/>
+              </a:rPr>
+              <a:t> to validate strategies before live-market execution.</a:t>
+            </a:r>
+          </a:p>
+          <a:p>
+            <a:endParaRPr lang="en-US" dirty="0"/>
+          </a:p>
+        </p:txBody>
+      </p:sp>
+      <p:sp>
+        <p:nvSpPr>
+          <p:cNvPr id="4" name="Slide Number Placeholder 3"/>
+          <p:cNvSpPr>
+            <a:spLocks noGrp="1"/>
+          </p:cNvSpPr>
+          <p:nvPr>
+            <p:ph type="sldNum" sz="quarter" idx="5"/>
+          </p:nvPr>
+        </p:nvSpPr>
+        <p:spPr/>
+        <p:txBody>
+          <a:bodyPr/>
+          <a:lstStyle/>
+          <a:p>
+            <a:fld id="{531D13CD-66F2-4CB3-ACBB-6CF6081D754D}" type="slidenum">
+              <a:rPr lang="en-US" smtClean="0"/>
+              <a:t>21</a:t>
+            </a:fld>
+            <a:endParaRPr lang="en-US"/>
+          </a:p>
+        </p:txBody>
+      </p:sp>
+    </p:spTree>
+    <p:extLst>
+      <p:ext uri="{BB962C8B-B14F-4D97-AF65-F5344CB8AC3E}">
+        <p14:creationId xmlns:p14="http://schemas.microsoft.com/office/powerpoint/2010/main" val="195857917"/>
+      </p:ext>
+    </p:extLst>
+  </p:cSld>
+  <p:clrMapOvr>
+    <a:masterClrMapping/>
+  </p:clrMapOvr>
+</p:notes>
+</file>
+
+<file path=ppt/notesSlides/notesSlide8.xml><?xml version="1.0" encoding="utf-8"?>
+<p:notes xmlns:a="http://schemas.openxmlformats.org/drawingml/2006/main" xmlns:r="http://schemas.openxmlformats.org/officeDocument/2006/relationships" xmlns:p="http://schemas.openxmlformats.org/presentationml/2006/main">
+  <p:cSld>
+    <p:spTree>
+      <p:nvGrpSpPr>
+        <p:cNvPr id="1" name=""/>
+        <p:cNvGrpSpPr/>
+        <p:nvPr/>
+      </p:nvGrpSpPr>
+      <p:grpSpPr>
+        <a:xfrm>
+          <a:off x="0" y="0"/>
+          <a:ext cx="0" cy="0"/>
+          <a:chOff x="0" y="0"/>
+          <a:chExt cx="0" cy="0"/>
+        </a:xfrm>
+      </p:grpSpPr>
+      <p:sp>
+        <p:nvSpPr>
+          <p:cNvPr id="2" name="Slide Image Placeholder 1"/>
+          <p:cNvSpPr>
+            <a:spLocks noGrp="1" noRot="1" noChangeAspect="1"/>
+          </p:cNvSpPr>
+          <p:nvPr>
+            <p:ph type="sldImg"/>
+          </p:nvPr>
+        </p:nvSpPr>
+        <p:spPr/>
+      </p:sp>
+      <p:sp>
+        <p:nvSpPr>
+          <p:cNvPr id="3" name="Notes Placeholder 2"/>
+          <p:cNvSpPr>
+            <a:spLocks noGrp="1"/>
+          </p:cNvSpPr>
+          <p:nvPr>
+            <p:ph type="body" idx="1"/>
+          </p:nvPr>
+        </p:nvSpPr>
+        <p:spPr/>
+        <p:txBody>
+          <a:bodyPr/>
+          <a:lstStyle/>
+          <a:p>
+            <a:pPr algn="l">
+              <a:buFont typeface="Arial" panose="020B0604020202020204" pitchFamily="34" charset="0"/>
+              <a:buChar char="•"/>
+            </a:pPr>
+            <a:r>
+              <a:rPr lang="en-US" b="1" i="0" dirty="0">
+                <a:solidFill>
+                  <a:srgbClr val="ECECEC"/>
+                </a:solidFill>
+                <a:effectLst/>
+                <a:highlight>
+                  <a:srgbClr val="212121"/>
+                </a:highlight>
+                <a:latin typeface="Söhne"/>
+              </a:rPr>
+              <a:t>User Interface</a:t>
+            </a:r>
+            <a:r>
+              <a:rPr lang="en-US" b="0" i="0" dirty="0">
+                <a:solidFill>
+                  <a:srgbClr val="ECECEC"/>
+                </a:solidFill>
+                <a:effectLst/>
+                <a:highlight>
+                  <a:srgbClr val="212121"/>
+                </a:highlight>
+                <a:latin typeface="Söhne"/>
+              </a:rPr>
+              <a:t>:</a:t>
+            </a:r>
+          </a:p>
+          <a:p>
+            <a:pPr marL="742950" lvl="1" indent="-285750" algn="l">
+              <a:buFont typeface="Arial" panose="020B0604020202020204" pitchFamily="34" charset="0"/>
+              <a:buChar char="•"/>
+            </a:pPr>
+            <a:r>
+              <a:rPr lang="en-US" b="0" i="0" dirty="0">
+                <a:solidFill>
+                  <a:srgbClr val="ECECEC"/>
+                </a:solidFill>
+                <a:effectLst/>
+                <a:highlight>
+                  <a:srgbClr val="212121"/>
+                </a:highlight>
+                <a:latin typeface="Söhne"/>
+              </a:rPr>
+              <a:t>Will have a interactive dashboard for visualization.</a:t>
+            </a:r>
+          </a:p>
+          <a:p>
+            <a:pPr marL="742950" lvl="1" indent="-285750" algn="l">
+              <a:buFont typeface="Arial" panose="020B0604020202020204" pitchFamily="34" charset="0"/>
+              <a:buChar char="•"/>
+            </a:pPr>
+            <a:r>
+              <a:rPr lang="en-US" b="0" i="0" dirty="0">
+                <a:solidFill>
+                  <a:srgbClr val="ECECEC"/>
+                </a:solidFill>
+                <a:effectLst/>
+                <a:highlight>
+                  <a:srgbClr val="212121"/>
+                </a:highlight>
+                <a:latin typeface="Söhne"/>
+              </a:rPr>
+              <a:t>Real-time display of market analytics and different types of strategies to try out</a:t>
+            </a:r>
+          </a:p>
+          <a:p>
+            <a:pPr algn="l">
+              <a:buFont typeface="Arial" panose="020B0604020202020204" pitchFamily="34" charset="0"/>
+              <a:buChar char="•"/>
+            </a:pPr>
+            <a:r>
+              <a:rPr lang="en-US" b="1" i="0" dirty="0">
+                <a:solidFill>
+                  <a:srgbClr val="ECECEC"/>
+                </a:solidFill>
+                <a:effectLst/>
+                <a:highlight>
+                  <a:srgbClr val="212121"/>
+                </a:highlight>
+                <a:latin typeface="Söhne"/>
+              </a:rPr>
+              <a:t>Feedback Loop</a:t>
+            </a:r>
+            <a:r>
+              <a:rPr lang="en-US" b="0" i="0" dirty="0">
+                <a:solidFill>
+                  <a:srgbClr val="ECECEC"/>
+                </a:solidFill>
+                <a:effectLst/>
+                <a:highlight>
+                  <a:srgbClr val="212121"/>
+                </a:highlight>
+                <a:latin typeface="Söhne"/>
+              </a:rPr>
+              <a:t>:</a:t>
+            </a:r>
+          </a:p>
+          <a:p>
+            <a:pPr marL="742950" lvl="1" indent="-285750" algn="l">
+              <a:buFont typeface="Arial" panose="020B0604020202020204" pitchFamily="34" charset="0"/>
+              <a:buChar char="•"/>
+            </a:pPr>
+            <a:r>
+              <a:rPr lang="en-US" b="0" i="0" dirty="0">
+                <a:solidFill>
+                  <a:srgbClr val="ECECEC"/>
+                </a:solidFill>
+                <a:effectLst/>
+                <a:highlight>
+                  <a:srgbClr val="212121"/>
+                </a:highlight>
+                <a:latin typeface="Söhne"/>
+              </a:rPr>
+              <a:t>takes user feedback and adjustments for system refinement.</a:t>
+            </a:r>
+          </a:p>
+          <a:p>
+            <a:pPr marL="742950" lvl="1" indent="-285750" algn="l">
+              <a:buFont typeface="Arial" panose="020B0604020202020204" pitchFamily="34" charset="0"/>
+              <a:buChar char="•"/>
+            </a:pPr>
+            <a:r>
+              <a:rPr lang="en-US" b="0" i="0" dirty="0">
+                <a:solidFill>
+                  <a:srgbClr val="ECECEC"/>
+                </a:solidFill>
+                <a:effectLst/>
+                <a:highlight>
+                  <a:srgbClr val="212121"/>
+                </a:highlight>
+                <a:latin typeface="Söhne"/>
+              </a:rPr>
+              <a:t>Allows for customizations and preferences in the trading strategy.</a:t>
+            </a:r>
+          </a:p>
+          <a:p>
+            <a:pPr marL="742950" lvl="1" indent="-285750" algn="l">
+              <a:buFont typeface="Arial" panose="020B0604020202020204" pitchFamily="34" charset="0"/>
+              <a:buChar char="•"/>
+            </a:pPr>
+            <a:r>
+              <a:rPr lang="en-US" b="0" i="0" dirty="0">
+                <a:solidFill>
+                  <a:srgbClr val="ECECEC"/>
+                </a:solidFill>
+                <a:effectLst/>
+                <a:highlight>
+                  <a:srgbClr val="212121"/>
+                </a:highlight>
+                <a:latin typeface="Söhne"/>
+              </a:rPr>
+              <a:t>Feedback will be used to fine-tune models and improve future predictions.</a:t>
+            </a:r>
+          </a:p>
+          <a:p>
+            <a:pPr algn="l">
+              <a:buFont typeface="Arial" panose="020B0604020202020204" pitchFamily="34" charset="0"/>
+              <a:buNone/>
+            </a:pPr>
+            <a:endParaRPr lang="en-US" b="0" i="0" dirty="0">
+              <a:solidFill>
+                <a:srgbClr val="ECECEC"/>
+              </a:solidFill>
+              <a:effectLst/>
+              <a:highlight>
+                <a:srgbClr val="212121"/>
+              </a:highlight>
+              <a:latin typeface="Söhne"/>
+            </a:endParaRPr>
+          </a:p>
+          <a:p>
+            <a:pPr marL="742950" lvl="1" indent="-285750" algn="l">
+              <a:buFont typeface="Arial" panose="020B0604020202020204" pitchFamily="34" charset="0"/>
+              <a:buChar char="•"/>
+            </a:pPr>
+            <a:r>
+              <a:rPr lang="en-US" b="0" i="0" dirty="0">
+                <a:solidFill>
+                  <a:srgbClr val="ECECEC"/>
+                </a:solidFill>
+                <a:effectLst/>
+                <a:highlight>
+                  <a:srgbClr val="212121"/>
+                </a:highlight>
+                <a:latin typeface="Söhne"/>
+              </a:rPr>
+              <a:t>Presents analyzed data and insights in an accessible format.</a:t>
+            </a:r>
+          </a:p>
+          <a:p>
+            <a:pPr marL="742950" lvl="1" indent="-285750" algn="l">
+              <a:buFont typeface="Arial" panose="020B0604020202020204" pitchFamily="34" charset="0"/>
+              <a:buChar char="•"/>
+            </a:pPr>
+            <a:r>
+              <a:rPr lang="en-US" b="0" i="0" dirty="0">
+                <a:solidFill>
+                  <a:srgbClr val="ECECEC"/>
+                </a:solidFill>
+                <a:effectLst/>
+                <a:highlight>
+                  <a:srgbClr val="212121"/>
+                </a:highlight>
+                <a:latin typeface="Söhne"/>
+              </a:rPr>
+              <a:t>Delivers clear trading signals for user execution.</a:t>
+            </a:r>
+          </a:p>
+          <a:p>
+            <a:pPr marL="742950" lvl="1" indent="-285750" algn="l">
+              <a:buFont typeface="Arial" panose="020B0604020202020204" pitchFamily="34" charset="0"/>
+              <a:buChar char="•"/>
+            </a:pPr>
+            <a:r>
+              <a:rPr lang="en-US" b="0" i="0" dirty="0">
+                <a:solidFill>
+                  <a:srgbClr val="ECECEC"/>
+                </a:solidFill>
+                <a:effectLst/>
+                <a:highlight>
+                  <a:srgbClr val="212121"/>
+                </a:highlight>
+                <a:latin typeface="Söhne"/>
+              </a:rPr>
+              <a:t>Facilitates evaluation of the system’s performance and strategy effectiveness.</a:t>
+            </a:r>
+          </a:p>
+          <a:p>
+            <a:endParaRPr lang="en-US" dirty="0"/>
+          </a:p>
+        </p:txBody>
+      </p:sp>
+      <p:sp>
+        <p:nvSpPr>
+          <p:cNvPr id="4" name="Slide Number Placeholder 3"/>
+          <p:cNvSpPr>
+            <a:spLocks noGrp="1"/>
+          </p:cNvSpPr>
+          <p:nvPr>
+            <p:ph type="sldNum" sz="quarter" idx="5"/>
+          </p:nvPr>
+        </p:nvSpPr>
+        <p:spPr/>
+        <p:txBody>
+          <a:bodyPr/>
+          <a:lstStyle/>
+          <a:p>
+            <a:fld id="{531D13CD-66F2-4CB3-ACBB-6CF6081D754D}" type="slidenum">
+              <a:rPr lang="en-US" smtClean="0"/>
+              <a:t>22</a:t>
+            </a:fld>
+            <a:endParaRPr lang="en-US"/>
+          </a:p>
+        </p:txBody>
+      </p:sp>
+    </p:spTree>
+    <p:extLst>
+      <p:ext uri="{BB962C8B-B14F-4D97-AF65-F5344CB8AC3E}">
+        <p14:creationId xmlns:p14="http://schemas.microsoft.com/office/powerpoint/2010/main" val="1377686086"/>
+      </p:ext>
+    </p:extLst>
+  </p:cSld>
+  <p:clrMapOvr>
+    <a:masterClrMapping/>
+  </p:clrMapOvr>
+</p:notes>
+</file>
+
+<file path=ppt/notesSlides/notesSlide9.xml><?xml version="1.0" encoding="utf-8"?>
+<p:notes xmlns:a="http://schemas.openxmlformats.org/drawingml/2006/main" xmlns:r="http://schemas.openxmlformats.org/officeDocument/2006/relationships" xmlns:p="http://schemas.openxmlformats.org/presentationml/2006/main">
+  <p:cSld>
+    <p:spTree>
+      <p:nvGrpSpPr>
+        <p:cNvPr id="1" name=""/>
+        <p:cNvGrpSpPr/>
+        <p:nvPr/>
+      </p:nvGrpSpPr>
+      <p:grpSpPr>
+        <a:xfrm>
+          <a:off x="0" y="0"/>
+          <a:ext cx="0" cy="0"/>
+          <a:chOff x="0" y="0"/>
+          <a:chExt cx="0" cy="0"/>
+        </a:xfrm>
+      </p:grpSpPr>
+      <p:sp>
+        <p:nvSpPr>
+          <p:cNvPr id="2" name="Slide Image Placeholder 1"/>
+          <p:cNvSpPr>
+            <a:spLocks noGrp="1" noRot="1" noChangeAspect="1"/>
+          </p:cNvSpPr>
+          <p:nvPr>
+            <p:ph type="sldImg"/>
+          </p:nvPr>
+        </p:nvSpPr>
+        <p:spPr/>
+      </p:sp>
+      <p:sp>
+        <p:nvSpPr>
+          <p:cNvPr id="3" name="Notes Placeholder 2"/>
+          <p:cNvSpPr>
+            <a:spLocks noGrp="1"/>
+          </p:cNvSpPr>
+          <p:nvPr>
+            <p:ph type="body" idx="1"/>
+          </p:nvPr>
+        </p:nvSpPr>
+        <p:spPr/>
+        <p:txBody>
+          <a:bodyPr/>
+          <a:lstStyle/>
+          <a:p>
+            <a:endParaRPr lang="en-US" dirty="0"/>
+          </a:p>
+        </p:txBody>
+      </p:sp>
+      <p:sp>
+        <p:nvSpPr>
+          <p:cNvPr id="4" name="Slide Number Placeholder 3"/>
+          <p:cNvSpPr>
+            <a:spLocks noGrp="1"/>
+          </p:cNvSpPr>
+          <p:nvPr>
+            <p:ph type="sldNum" sz="quarter" idx="5"/>
+          </p:nvPr>
+        </p:nvSpPr>
+        <p:spPr/>
+        <p:txBody>
+          <a:bodyPr/>
+          <a:lstStyle/>
+          <a:p>
+            <a:fld id="{531D13CD-66F2-4CB3-ACBB-6CF6081D754D}" type="slidenum">
+              <a:rPr lang="en-US" smtClean="0"/>
+              <a:t>23</a:t>
+            </a:fld>
+            <a:endParaRPr lang="en-US"/>
+          </a:p>
+        </p:txBody>
+      </p:sp>
+    </p:spTree>
+    <p:extLst>
+      <p:ext uri="{BB962C8B-B14F-4D97-AF65-F5344CB8AC3E}">
+        <p14:creationId xmlns:p14="http://schemas.microsoft.com/office/powerpoint/2010/main" val="1520507546"/>
       </p:ext>
     </p:extLst>
   </p:cSld>
@@ -8830,6 +10678,180 @@
           <p:cNvPr id="4" name="Title 3">
             <a:extLst>
               <a:ext uri="{FF2B5EF4-FFF2-40B4-BE49-F238E27FC236}">
+                <a16:creationId xmlns:a16="http://schemas.microsoft.com/office/drawing/2014/main" id="{B207A9E5-93A6-60B0-9B71-C1CD0352B0C7}"/>
+              </a:ext>
+            </a:extLst>
+          </p:cNvPr>
+          <p:cNvSpPr>
+            <a:spLocks noGrp="1"/>
+          </p:cNvSpPr>
+          <p:nvPr>
+            <p:ph type="ctrTitle"/>
+          </p:nvPr>
+        </p:nvSpPr>
+        <p:spPr/>
+        <p:txBody>
+          <a:bodyPr/>
+          <a:lstStyle/>
+          <a:p>
+            <a:r>
+              <a:rPr lang="en-US" dirty="0"/>
+              <a:t>Overview</a:t>
+            </a:r>
+          </a:p>
+        </p:txBody>
+      </p:sp>
+    </p:spTree>
+    <p:extLst>
+      <p:ext uri="{BB962C8B-B14F-4D97-AF65-F5344CB8AC3E}">
+        <p14:creationId xmlns:p14="http://schemas.microsoft.com/office/powerpoint/2010/main" val="1677077069"/>
+      </p:ext>
+    </p:extLst>
+  </p:cSld>
+  <p:clrMapOvr>
+    <a:masterClrMapping/>
+  </p:clrMapOvr>
+</p:sld>
+</file>
+
+<file path=ppt/slides/slide16.xml><?xml version="1.0" encoding="utf-8"?>
+<p:sld xmlns:a="http://schemas.openxmlformats.org/drawingml/2006/main" xmlns:r="http://schemas.openxmlformats.org/officeDocument/2006/relationships" xmlns:p="http://schemas.openxmlformats.org/presentationml/2006/main">
+  <p:cSld>
+    <p:spTree>
+      <p:nvGrpSpPr>
+        <p:cNvPr id="1" name=""/>
+        <p:cNvGrpSpPr/>
+        <p:nvPr/>
+      </p:nvGrpSpPr>
+      <p:grpSpPr>
+        <a:xfrm>
+          <a:off x="0" y="0"/>
+          <a:ext cx="0" cy="0"/>
+          <a:chOff x="0" y="0"/>
+          <a:chExt cx="0" cy="0"/>
+        </a:xfrm>
+      </p:grpSpPr>
+      <p:sp>
+        <p:nvSpPr>
+          <p:cNvPr id="2" name="Title 1">
+            <a:extLst>
+              <a:ext uri="{FF2B5EF4-FFF2-40B4-BE49-F238E27FC236}">
+                <a16:creationId xmlns:a16="http://schemas.microsoft.com/office/drawing/2014/main" id="{B08C1629-CB9C-AFBA-3493-6EADBB1498B1}"/>
+              </a:ext>
+            </a:extLst>
+          </p:cNvPr>
+          <p:cNvSpPr>
+            <a:spLocks noGrp="1"/>
+          </p:cNvSpPr>
+          <p:nvPr>
+            <p:ph type="title"/>
+          </p:nvPr>
+        </p:nvSpPr>
+        <p:spPr/>
+        <p:txBody>
+          <a:bodyPr/>
+          <a:lstStyle/>
+          <a:p>
+            <a:r>
+              <a:rPr lang="en-US" dirty="0"/>
+              <a:t>Optimizing + Reinforcement Learning</a:t>
+            </a:r>
+          </a:p>
+        </p:txBody>
+      </p:sp>
+      <p:sp>
+        <p:nvSpPr>
+          <p:cNvPr id="3" name="Content Placeholder 2">
+            <a:extLst>
+              <a:ext uri="{FF2B5EF4-FFF2-40B4-BE49-F238E27FC236}">
+                <a16:creationId xmlns:a16="http://schemas.microsoft.com/office/drawing/2014/main" id="{2749D226-39C3-4994-740B-3BE7CC2B89C9}"/>
+              </a:ext>
+            </a:extLst>
+          </p:cNvPr>
+          <p:cNvSpPr>
+            <a:spLocks noGrp="1"/>
+          </p:cNvSpPr>
+          <p:nvPr>
+            <p:ph idx="1"/>
+          </p:nvPr>
+        </p:nvSpPr>
+        <p:spPr/>
+        <p:txBody>
+          <a:bodyPr/>
+          <a:lstStyle/>
+          <a:p>
+            <a:r>
+              <a:rPr lang="en-US" dirty="0"/>
+              <a:t>What it is : RL + Time Series Forecasting</a:t>
+            </a:r>
+          </a:p>
+          <a:p>
+            <a:r>
+              <a:rPr lang="en-US" dirty="0"/>
+              <a:t>Goals</a:t>
+            </a:r>
+          </a:p>
+          <a:p>
+            <a:pPr lvl="1"/>
+            <a:r>
+              <a:rPr lang="en-US" dirty="0"/>
+              <a:t>Enhanced Forecasting</a:t>
+            </a:r>
+          </a:p>
+          <a:p>
+            <a:pPr lvl="1"/>
+            <a:r>
+              <a:rPr lang="en-US" dirty="0"/>
+              <a:t>Trading Decisions</a:t>
+            </a:r>
+          </a:p>
+          <a:p>
+            <a:pPr lvl="1"/>
+            <a:r>
+              <a:rPr lang="en-US" dirty="0"/>
+              <a:t>Increase Profitability</a:t>
+            </a:r>
+          </a:p>
+          <a:p>
+            <a:endParaRPr lang="en-US" dirty="0"/>
+          </a:p>
+        </p:txBody>
+      </p:sp>
+    </p:spTree>
+    <p:extLst>
+      <p:ext uri="{BB962C8B-B14F-4D97-AF65-F5344CB8AC3E}">
+        <p14:creationId xmlns:p14="http://schemas.microsoft.com/office/powerpoint/2010/main" val="4067723570"/>
+      </p:ext>
+    </p:extLst>
+  </p:cSld>
+  <p:clrMapOvr>
+    <a:masterClrMapping/>
+  </p:clrMapOvr>
+</p:sld>
+</file>
+
+<file path=ppt/slides/slide17.xml><?xml version="1.0" encoding="utf-8"?>
+<p:sld xmlns:a="http://schemas.openxmlformats.org/drawingml/2006/main" xmlns:r="http://schemas.openxmlformats.org/officeDocument/2006/relationships" xmlns:p="http://schemas.openxmlformats.org/presentationml/2006/main">
+  <p:cSld>
+    <p:spTree>
+      <p:nvGrpSpPr>
+        <p:cNvPr id="1" name=""/>
+        <p:cNvGrpSpPr/>
+        <p:nvPr/>
+      </p:nvGrpSpPr>
+      <p:grpSpPr>
+        <a:xfrm>
+          <a:off x="0" y="0"/>
+          <a:ext cx="0" cy="0"/>
+          <a:chOff x="0" y="0"/>
+          <a:chExt cx="0" cy="0"/>
+        </a:xfrm>
+      </p:grpSpPr>
+      <p:sp>
+        <p:nvSpPr>
+          <p:cNvPr id="4" name="Title 3">
+            <a:extLst>
+              <a:ext uri="{FF2B5EF4-FFF2-40B4-BE49-F238E27FC236}">
                 <a16:creationId xmlns:a16="http://schemas.microsoft.com/office/drawing/2014/main" id="{24B1C769-7A75-60FD-35C8-86A73F01B823}"/>
               </a:ext>
             </a:extLst>
@@ -8866,7 +10888,7 @@
 </p:sld>
 </file>
 
-<file path=ppt/slides/slide16.xml><?xml version="1.0" encoding="utf-8"?>
+<file path=ppt/slides/slide18.xml><?xml version="1.0" encoding="utf-8"?>
 <p:sld xmlns:a="http://schemas.openxmlformats.org/drawingml/2006/main" xmlns:r="http://schemas.openxmlformats.org/officeDocument/2006/relationships" xmlns:p="http://schemas.openxmlformats.org/presentationml/2006/main">
   <p:cSld>
     <p:spTree>
@@ -8932,144 +10954,6 @@
 </p:sld>
 </file>
 
-<file path=ppt/slides/slide17.xml><?xml version="1.0" encoding="utf-8"?>
-<p:sld xmlns:a="http://schemas.openxmlformats.org/drawingml/2006/main" xmlns:r="http://schemas.openxmlformats.org/officeDocument/2006/relationships" xmlns:p="http://schemas.openxmlformats.org/presentationml/2006/main">
-  <p:cSld>
-    <p:spTree>
-      <p:nvGrpSpPr>
-        <p:cNvPr id="1" name=""/>
-        <p:cNvGrpSpPr/>
-        <p:nvPr/>
-      </p:nvGrpSpPr>
-      <p:grpSpPr>
-        <a:xfrm>
-          <a:off x="0" y="0"/>
-          <a:ext cx="0" cy="0"/>
-          <a:chOff x="0" y="0"/>
-          <a:chExt cx="0" cy="0"/>
-        </a:xfrm>
-      </p:grpSpPr>
-      <p:sp>
-        <p:nvSpPr>
-          <p:cNvPr id="4" name="Title 3">
-            <a:extLst>
-              <a:ext uri="{FF2B5EF4-FFF2-40B4-BE49-F238E27FC236}">
-                <a16:creationId xmlns:a16="http://schemas.microsoft.com/office/drawing/2014/main" id="{24B1C769-7A75-60FD-35C8-86A73F01B823}"/>
-              </a:ext>
-            </a:extLst>
-          </p:cNvPr>
-          <p:cNvSpPr>
-            <a:spLocks noGrp="1"/>
-          </p:cNvSpPr>
-          <p:nvPr>
-            <p:ph type="ctrTitle"/>
-          </p:nvPr>
-        </p:nvSpPr>
-        <p:spPr/>
-        <p:txBody>
-          <a:bodyPr/>
-          <a:lstStyle/>
-          <a:p>
-            <a:r>
-              <a:rPr lang="en-US" dirty="0"/>
-              <a:t>Domain Model</a:t>
-            </a:r>
-          </a:p>
-        </p:txBody>
-      </p:sp>
-    </p:spTree>
-    <p:extLst>
-      <p:ext uri="{BB962C8B-B14F-4D97-AF65-F5344CB8AC3E}">
-        <p14:creationId xmlns:p14="http://schemas.microsoft.com/office/powerpoint/2010/main" val="3181279729"/>
-      </p:ext>
-    </p:extLst>
-  </p:cSld>
-  <p:clrMapOvr>
-    <a:masterClrMapping/>
-  </p:clrMapOvr>
-</p:sld>
-</file>
-
-<file path=ppt/slides/slide18.xml><?xml version="1.0" encoding="utf-8"?>
-<p:sld xmlns:a="http://schemas.openxmlformats.org/drawingml/2006/main" xmlns:r="http://schemas.openxmlformats.org/officeDocument/2006/relationships" xmlns:p="http://schemas.openxmlformats.org/presentationml/2006/main">
-  <p:cSld>
-    <p:spTree>
-      <p:nvGrpSpPr>
-        <p:cNvPr id="1" name=""/>
-        <p:cNvGrpSpPr/>
-        <p:nvPr/>
-      </p:nvGrpSpPr>
-      <p:grpSpPr>
-        <a:xfrm>
-          <a:off x="0" y="0"/>
-          <a:ext cx="0" cy="0"/>
-          <a:chOff x="0" y="0"/>
-          <a:chExt cx="0" cy="0"/>
-        </a:xfrm>
-      </p:grpSpPr>
-      <p:sp>
-        <p:nvSpPr>
-          <p:cNvPr id="2" name="Title 1">
-            <a:extLst>
-              <a:ext uri="{FF2B5EF4-FFF2-40B4-BE49-F238E27FC236}">
-                <a16:creationId xmlns:a16="http://schemas.microsoft.com/office/drawing/2014/main" id="{806966B3-05B6-B3BE-FCDE-08ECD6A296F5}"/>
-              </a:ext>
-            </a:extLst>
-          </p:cNvPr>
-          <p:cNvSpPr>
-            <a:spLocks noGrp="1"/>
-          </p:cNvSpPr>
-          <p:nvPr>
-            <p:ph type="title"/>
-          </p:nvPr>
-        </p:nvSpPr>
-        <p:spPr/>
-        <p:txBody>
-          <a:bodyPr/>
-          <a:lstStyle/>
-          <a:p>
-            <a:endParaRPr lang="en-US"/>
-          </a:p>
-        </p:txBody>
-      </p:sp>
-      <p:sp>
-        <p:nvSpPr>
-          <p:cNvPr id="3" name="Content Placeholder 2">
-            <a:extLst>
-              <a:ext uri="{FF2B5EF4-FFF2-40B4-BE49-F238E27FC236}">
-                <a16:creationId xmlns:a16="http://schemas.microsoft.com/office/drawing/2014/main" id="{CF465D89-DE34-166B-9DFB-B11690A9E048}"/>
-              </a:ext>
-            </a:extLst>
-          </p:cNvPr>
-          <p:cNvSpPr>
-            <a:spLocks noGrp="1"/>
-          </p:cNvSpPr>
-          <p:nvPr>
-            <p:ph idx="1"/>
-          </p:nvPr>
-        </p:nvSpPr>
-        <p:spPr/>
-        <p:txBody>
-          <a:bodyPr/>
-          <a:lstStyle/>
-          <a:p>
-            <a:endParaRPr lang="en-US"/>
-          </a:p>
-        </p:txBody>
-      </p:sp>
-    </p:spTree>
-    <p:extLst>
-      <p:ext uri="{BB962C8B-B14F-4D97-AF65-F5344CB8AC3E}">
-        <p14:creationId xmlns:p14="http://schemas.microsoft.com/office/powerpoint/2010/main" val="2044482667"/>
-      </p:ext>
-    </p:extLst>
-  </p:cSld>
-  <p:clrMapOvr>
-    <a:masterClrMapping/>
-  </p:clrMapOvr>
-</p:sld>
-</file>
-
 <file path=ppt/slides/slide19.xml><?xml version="1.0" encoding="utf-8"?>
 <p:sld xmlns:a="http://schemas.openxmlformats.org/drawingml/2006/main" xmlns:r="http://schemas.openxmlformats.org/officeDocument/2006/relationships" xmlns:p="http://schemas.openxmlformats.org/presentationml/2006/main">
   <p:cSld>
@@ -9089,10 +10973,10 @@
       </p:grpSpPr>
       <p:sp>
         <p:nvSpPr>
-          <p:cNvPr id="2" name="Title 1">
-            <a:extLst>
-              <a:ext uri="{FF2B5EF4-FFF2-40B4-BE49-F238E27FC236}">
-                <a16:creationId xmlns:a16="http://schemas.microsoft.com/office/drawing/2014/main" id="{45AE1356-FF3F-8020-F581-09833A016672}"/>
+          <p:cNvPr id="4" name="Title 3">
+            <a:extLst>
+              <a:ext uri="{FF2B5EF4-FFF2-40B4-BE49-F238E27FC236}">
+                <a16:creationId xmlns:a16="http://schemas.microsoft.com/office/drawing/2014/main" id="{24B1C769-7A75-60FD-35C8-86A73F01B823}"/>
               </a:ext>
             </a:extLst>
           </p:cNvPr>
@@ -9105,14 +10989,12 @@
         </p:nvSpPr>
         <p:spPr/>
         <p:txBody>
-          <a:bodyPr>
-            <a:normAutofit/>
-          </a:bodyPr>
-          <a:lstStyle/>
-          <a:p>
-            <a:r>
-              <a:rPr lang="en-US" sz="5400" dirty="0"/>
-              <a:t>Thank you</a:t>
+          <a:bodyPr/>
+          <a:lstStyle/>
+          <a:p>
+            <a:r>
+              <a:rPr lang="en-US" dirty="0"/>
+              <a:t>Architecture Model</a:t>
             </a:r>
           </a:p>
         </p:txBody>
@@ -9120,7 +11002,7 @@
     </p:spTree>
     <p:extLst>
       <p:ext uri="{BB962C8B-B14F-4D97-AF65-F5344CB8AC3E}">
-        <p14:creationId xmlns:p14="http://schemas.microsoft.com/office/powerpoint/2010/main" val="1591205852"/>
+        <p14:creationId xmlns:p14="http://schemas.microsoft.com/office/powerpoint/2010/main" val="3181279729"/>
       </p:ext>
     </p:extLst>
   </p:cSld>
@@ -9225,6 +11107,593 @@
     <p:extLst>
       <p:ext uri="{BB962C8B-B14F-4D97-AF65-F5344CB8AC3E}">
         <p14:creationId xmlns:p14="http://schemas.microsoft.com/office/powerpoint/2010/main" val="2312986498"/>
+      </p:ext>
+    </p:extLst>
+  </p:cSld>
+  <p:clrMapOvr>
+    <a:masterClrMapping/>
+  </p:clrMapOvr>
+</p:sld>
+</file>
+
+<file path=ppt/slides/slide20.xml><?xml version="1.0" encoding="utf-8"?>
+<p:sld xmlns:a="http://schemas.openxmlformats.org/drawingml/2006/main" xmlns:r="http://schemas.openxmlformats.org/officeDocument/2006/relationships" xmlns:p="http://schemas.openxmlformats.org/presentationml/2006/main">
+  <p:cSld>
+    <p:spTree>
+      <p:nvGrpSpPr>
+        <p:cNvPr id="1" name=""/>
+        <p:cNvGrpSpPr/>
+        <p:nvPr/>
+      </p:nvGrpSpPr>
+      <p:grpSpPr>
+        <a:xfrm>
+          <a:off x="0" y="0"/>
+          <a:ext cx="0" cy="0"/>
+          <a:chOff x="0" y="0"/>
+          <a:chExt cx="0" cy="0"/>
+        </a:xfrm>
+      </p:grpSpPr>
+      <p:sp>
+        <p:nvSpPr>
+          <p:cNvPr id="2" name="Title 1">
+            <a:extLst>
+              <a:ext uri="{FF2B5EF4-FFF2-40B4-BE49-F238E27FC236}">
+                <a16:creationId xmlns:a16="http://schemas.microsoft.com/office/drawing/2014/main" id="{806966B3-05B6-B3BE-FCDE-08ECD6A296F5}"/>
+              </a:ext>
+            </a:extLst>
+          </p:cNvPr>
+          <p:cNvSpPr>
+            <a:spLocks noGrp="1"/>
+          </p:cNvSpPr>
+          <p:nvPr>
+            <p:ph type="title"/>
+          </p:nvPr>
+        </p:nvSpPr>
+        <p:spPr/>
+        <p:txBody>
+          <a:bodyPr/>
+          <a:lstStyle/>
+          <a:p>
+            <a:r>
+              <a:rPr lang="en-US" dirty="0"/>
+              <a:t>Data Foundations</a:t>
+            </a:r>
+          </a:p>
+        </p:txBody>
+      </p:sp>
+      <p:sp>
+        <p:nvSpPr>
+          <p:cNvPr id="3" name="Content Placeholder 2">
+            <a:extLst>
+              <a:ext uri="{FF2B5EF4-FFF2-40B4-BE49-F238E27FC236}">
+                <a16:creationId xmlns:a16="http://schemas.microsoft.com/office/drawing/2014/main" id="{CF465D89-DE34-166B-9DFB-B11690A9E048}"/>
+              </a:ext>
+            </a:extLst>
+          </p:cNvPr>
+          <p:cNvSpPr>
+            <a:spLocks noGrp="1"/>
+          </p:cNvSpPr>
+          <p:nvPr>
+            <p:ph idx="1"/>
+          </p:nvPr>
+        </p:nvSpPr>
+        <p:spPr/>
+        <p:txBody>
+          <a:bodyPr/>
+          <a:lstStyle/>
+          <a:p>
+            <a:r>
+              <a:rPr lang="en-US" dirty="0"/>
+              <a:t>Data Ingestion </a:t>
+            </a:r>
+          </a:p>
+          <a:p>
+            <a:r>
+              <a:rPr lang="en-US" dirty="0"/>
+              <a:t>Data Preprocessing and Feature Engineering </a:t>
+            </a:r>
+          </a:p>
+          <a:p>
+            <a:r>
+              <a:rPr lang="en-US" dirty="0"/>
+              <a:t>Database </a:t>
+            </a:r>
+          </a:p>
+        </p:txBody>
+      </p:sp>
+    </p:spTree>
+    <p:extLst>
+      <p:ext uri="{BB962C8B-B14F-4D97-AF65-F5344CB8AC3E}">
+        <p14:creationId xmlns:p14="http://schemas.microsoft.com/office/powerpoint/2010/main" val="2044482667"/>
+      </p:ext>
+    </p:extLst>
+  </p:cSld>
+  <p:clrMapOvr>
+    <a:masterClrMapping/>
+  </p:clrMapOvr>
+</p:sld>
+</file>
+
+<file path=ppt/slides/slide21.xml><?xml version="1.0" encoding="utf-8"?>
+<p:sld xmlns:a="http://schemas.openxmlformats.org/drawingml/2006/main" xmlns:r="http://schemas.openxmlformats.org/officeDocument/2006/relationships" xmlns:p="http://schemas.openxmlformats.org/presentationml/2006/main">
+  <p:cSld>
+    <p:spTree>
+      <p:nvGrpSpPr>
+        <p:cNvPr id="1" name=""/>
+        <p:cNvGrpSpPr/>
+        <p:nvPr/>
+      </p:nvGrpSpPr>
+      <p:grpSpPr>
+        <a:xfrm>
+          <a:off x="0" y="0"/>
+          <a:ext cx="0" cy="0"/>
+          <a:chOff x="0" y="0"/>
+          <a:chExt cx="0" cy="0"/>
+        </a:xfrm>
+      </p:grpSpPr>
+      <p:sp>
+        <p:nvSpPr>
+          <p:cNvPr id="2" name="Title 1">
+            <a:extLst>
+              <a:ext uri="{FF2B5EF4-FFF2-40B4-BE49-F238E27FC236}">
+                <a16:creationId xmlns:a16="http://schemas.microsoft.com/office/drawing/2014/main" id="{D8BC3646-0FEA-AB33-B4C9-A5F7DEF2FA66}"/>
+              </a:ext>
+            </a:extLst>
+          </p:cNvPr>
+          <p:cNvSpPr>
+            <a:spLocks noGrp="1"/>
+          </p:cNvSpPr>
+          <p:nvPr>
+            <p:ph type="title"/>
+          </p:nvPr>
+        </p:nvSpPr>
+        <p:spPr/>
+        <p:txBody>
+          <a:bodyPr/>
+          <a:lstStyle/>
+          <a:p>
+            <a:r>
+              <a:rPr lang="en-US" dirty="0"/>
+              <a:t>Intelligence Core</a:t>
+            </a:r>
+          </a:p>
+        </p:txBody>
+      </p:sp>
+      <p:sp>
+        <p:nvSpPr>
+          <p:cNvPr id="3" name="Content Placeholder 2">
+            <a:extLst>
+              <a:ext uri="{FF2B5EF4-FFF2-40B4-BE49-F238E27FC236}">
+                <a16:creationId xmlns:a16="http://schemas.microsoft.com/office/drawing/2014/main" id="{2107307D-EEC3-6AA8-4E88-EFE79D299C0C}"/>
+              </a:ext>
+            </a:extLst>
+          </p:cNvPr>
+          <p:cNvSpPr>
+            <a:spLocks noGrp="1"/>
+          </p:cNvSpPr>
+          <p:nvPr>
+            <p:ph idx="1"/>
+          </p:nvPr>
+        </p:nvSpPr>
+        <p:spPr/>
+        <p:txBody>
+          <a:bodyPr/>
+          <a:lstStyle/>
+          <a:p>
+            <a:r>
+              <a:rPr lang="en-US" dirty="0"/>
+              <a:t>Machine / Deep Learning Baseline Models </a:t>
+            </a:r>
+          </a:p>
+          <a:p>
+            <a:r>
+              <a:rPr lang="en-US" dirty="0"/>
+              <a:t>RL Agent </a:t>
+            </a:r>
+          </a:p>
+          <a:p>
+            <a:r>
+              <a:rPr lang="en-US" dirty="0"/>
+              <a:t>Algorithms </a:t>
+            </a:r>
+          </a:p>
+        </p:txBody>
+      </p:sp>
+    </p:spTree>
+    <p:extLst>
+      <p:ext uri="{BB962C8B-B14F-4D97-AF65-F5344CB8AC3E}">
+        <p14:creationId xmlns:p14="http://schemas.microsoft.com/office/powerpoint/2010/main" val="143789468"/>
+      </p:ext>
+    </p:extLst>
+  </p:cSld>
+  <p:clrMapOvr>
+    <a:masterClrMapping/>
+  </p:clrMapOvr>
+</p:sld>
+</file>
+
+<file path=ppt/slides/slide22.xml><?xml version="1.0" encoding="utf-8"?>
+<p:sld xmlns:a="http://schemas.openxmlformats.org/drawingml/2006/main" xmlns:r="http://schemas.openxmlformats.org/officeDocument/2006/relationships" xmlns:p="http://schemas.openxmlformats.org/presentationml/2006/main">
+  <p:cSld>
+    <p:spTree>
+      <p:nvGrpSpPr>
+        <p:cNvPr id="1" name=""/>
+        <p:cNvGrpSpPr/>
+        <p:nvPr/>
+      </p:nvGrpSpPr>
+      <p:grpSpPr>
+        <a:xfrm>
+          <a:off x="0" y="0"/>
+          <a:ext cx="0" cy="0"/>
+          <a:chOff x="0" y="0"/>
+          <a:chExt cx="0" cy="0"/>
+        </a:xfrm>
+      </p:grpSpPr>
+      <p:sp>
+        <p:nvSpPr>
+          <p:cNvPr id="2" name="Title 1">
+            <a:extLst>
+              <a:ext uri="{FF2B5EF4-FFF2-40B4-BE49-F238E27FC236}">
+                <a16:creationId xmlns:a16="http://schemas.microsoft.com/office/drawing/2014/main" id="{2633791C-1C62-164E-65AA-83398634B5F6}"/>
+              </a:ext>
+            </a:extLst>
+          </p:cNvPr>
+          <p:cNvSpPr>
+            <a:spLocks noGrp="1"/>
+          </p:cNvSpPr>
+          <p:nvPr>
+            <p:ph type="title"/>
+          </p:nvPr>
+        </p:nvSpPr>
+        <p:spPr/>
+        <p:txBody>
+          <a:bodyPr/>
+          <a:lstStyle/>
+          <a:p>
+            <a:r>
+              <a:rPr lang="en-US" dirty="0"/>
+              <a:t>User Interface</a:t>
+            </a:r>
+          </a:p>
+        </p:txBody>
+      </p:sp>
+      <p:sp>
+        <p:nvSpPr>
+          <p:cNvPr id="3" name="Content Placeholder 2">
+            <a:extLst>
+              <a:ext uri="{FF2B5EF4-FFF2-40B4-BE49-F238E27FC236}">
+                <a16:creationId xmlns:a16="http://schemas.microsoft.com/office/drawing/2014/main" id="{3CE82D0A-5BA1-6407-D47F-436AAA55EAA7}"/>
+              </a:ext>
+            </a:extLst>
+          </p:cNvPr>
+          <p:cNvSpPr>
+            <a:spLocks noGrp="1"/>
+          </p:cNvSpPr>
+          <p:nvPr>
+            <p:ph idx="1"/>
+          </p:nvPr>
+        </p:nvSpPr>
+        <p:spPr/>
+        <p:txBody>
+          <a:bodyPr/>
+          <a:lstStyle/>
+          <a:p>
+            <a:r>
+              <a:rPr lang="en-US" dirty="0"/>
+              <a:t>User Interface </a:t>
+            </a:r>
+          </a:p>
+          <a:p>
+            <a:r>
+              <a:rPr lang="en-US" dirty="0"/>
+              <a:t>Feedback Loop </a:t>
+            </a:r>
+          </a:p>
+          <a:p>
+            <a:r>
+              <a:rPr lang="en-US" dirty="0"/>
+              <a:t>Testing and Documentation </a:t>
+            </a:r>
+          </a:p>
+          <a:p>
+            <a:pPr marL="0" indent="0">
+              <a:buNone/>
+            </a:pPr>
+            <a:endParaRPr lang="en-US" dirty="0"/>
+          </a:p>
+        </p:txBody>
+      </p:sp>
+    </p:spTree>
+    <p:extLst>
+      <p:ext uri="{BB962C8B-B14F-4D97-AF65-F5344CB8AC3E}">
+        <p14:creationId xmlns:p14="http://schemas.microsoft.com/office/powerpoint/2010/main" val="851988791"/>
+      </p:ext>
+    </p:extLst>
+  </p:cSld>
+  <p:clrMapOvr>
+    <a:masterClrMapping/>
+  </p:clrMapOvr>
+</p:sld>
+</file>
+
+<file path=ppt/slides/slide23.xml><?xml version="1.0" encoding="utf-8"?>
+<p:sld xmlns:a="http://schemas.openxmlformats.org/drawingml/2006/main" xmlns:r="http://schemas.openxmlformats.org/officeDocument/2006/relationships" xmlns:p="http://schemas.openxmlformats.org/presentationml/2006/main">
+  <p:cSld>
+    <p:spTree>
+      <p:nvGrpSpPr>
+        <p:cNvPr id="1" name=""/>
+        <p:cNvGrpSpPr/>
+        <p:nvPr/>
+      </p:nvGrpSpPr>
+      <p:grpSpPr>
+        <a:xfrm>
+          <a:off x="0" y="0"/>
+          <a:ext cx="0" cy="0"/>
+          <a:chOff x="0" y="0"/>
+          <a:chExt cx="0" cy="0"/>
+        </a:xfrm>
+      </p:grpSpPr>
+      <p:pic>
+        <p:nvPicPr>
+          <p:cNvPr id="12" name="Picture 11">
+            <a:extLst>
+              <a:ext uri="{FF2B5EF4-FFF2-40B4-BE49-F238E27FC236}">
+                <a16:creationId xmlns:a16="http://schemas.microsoft.com/office/drawing/2014/main" id="{EA2CB9DE-3A3C-E15A-B36E-46EE53F9FDB6}"/>
+              </a:ext>
+            </a:extLst>
+          </p:cNvPr>
+          <p:cNvPicPr>
+            <a:picLocks noChangeAspect="1"/>
+          </p:cNvPicPr>
+          <p:nvPr/>
+        </p:nvPicPr>
+        <p:blipFill rotWithShape="1">
+          <a:blip r:embed="rId3"/>
+          <a:srcRect r="2799"/>
+          <a:stretch/>
+        </p:blipFill>
+        <p:spPr>
+          <a:xfrm>
+            <a:off x="284482" y="483177"/>
+            <a:ext cx="11574144" cy="6089073"/>
+          </a:xfrm>
+          <a:prstGeom prst="rect">
+            <a:avLst/>
+          </a:prstGeom>
+        </p:spPr>
+      </p:pic>
+    </p:spTree>
+    <p:extLst>
+      <p:ext uri="{BB962C8B-B14F-4D97-AF65-F5344CB8AC3E}">
+        <p14:creationId xmlns:p14="http://schemas.microsoft.com/office/powerpoint/2010/main" val="829213039"/>
+      </p:ext>
+    </p:extLst>
+  </p:cSld>
+  <p:clrMapOvr>
+    <a:masterClrMapping/>
+  </p:clrMapOvr>
+</p:sld>
+</file>
+
+<file path=ppt/slides/slide24.xml><?xml version="1.0" encoding="utf-8"?>
+<p:sld xmlns:a="http://schemas.openxmlformats.org/drawingml/2006/main" xmlns:r="http://schemas.openxmlformats.org/officeDocument/2006/relationships" xmlns:p="http://schemas.openxmlformats.org/presentationml/2006/main">
+  <p:cSld>
+    <p:spTree>
+      <p:nvGrpSpPr>
+        <p:cNvPr id="1" name=""/>
+        <p:cNvGrpSpPr/>
+        <p:nvPr/>
+      </p:nvGrpSpPr>
+      <p:grpSpPr>
+        <a:xfrm>
+          <a:off x="0" y="0"/>
+          <a:ext cx="0" cy="0"/>
+          <a:chOff x="0" y="0"/>
+          <a:chExt cx="0" cy="0"/>
+        </a:xfrm>
+      </p:grpSpPr>
+      <p:sp>
+        <p:nvSpPr>
+          <p:cNvPr id="4" name="Title 3">
+            <a:extLst>
+              <a:ext uri="{FF2B5EF4-FFF2-40B4-BE49-F238E27FC236}">
+                <a16:creationId xmlns:a16="http://schemas.microsoft.com/office/drawing/2014/main" id="{A06E3A84-2178-A0F9-7AD4-AB1088E95B15}"/>
+              </a:ext>
+            </a:extLst>
+          </p:cNvPr>
+          <p:cNvSpPr>
+            <a:spLocks noGrp="1"/>
+          </p:cNvSpPr>
+          <p:nvPr>
+            <p:ph type="ctrTitle"/>
+          </p:nvPr>
+        </p:nvSpPr>
+        <p:spPr/>
+        <p:txBody>
+          <a:bodyPr/>
+          <a:lstStyle/>
+          <a:p>
+            <a:r>
+              <a:rPr lang="en-US" dirty="0"/>
+              <a:t>GitHub and Demo</a:t>
+            </a:r>
+          </a:p>
+        </p:txBody>
+      </p:sp>
+    </p:spTree>
+    <p:extLst>
+      <p:ext uri="{BB962C8B-B14F-4D97-AF65-F5344CB8AC3E}">
+        <p14:creationId xmlns:p14="http://schemas.microsoft.com/office/powerpoint/2010/main" val="2563149893"/>
+      </p:ext>
+    </p:extLst>
+  </p:cSld>
+  <p:clrMapOvr>
+    <a:masterClrMapping/>
+  </p:clrMapOvr>
+</p:sld>
+</file>
+
+<file path=ppt/slides/slide25.xml><?xml version="1.0" encoding="utf-8"?>
+<p:sld xmlns:a="http://schemas.openxmlformats.org/drawingml/2006/main" xmlns:r="http://schemas.openxmlformats.org/officeDocument/2006/relationships" xmlns:p="http://schemas.openxmlformats.org/presentationml/2006/main">
+  <p:cSld>
+    <p:spTree>
+      <p:nvGrpSpPr>
+        <p:cNvPr id="1" name=""/>
+        <p:cNvGrpSpPr/>
+        <p:nvPr/>
+      </p:nvGrpSpPr>
+      <p:grpSpPr>
+        <a:xfrm>
+          <a:off x="0" y="0"/>
+          <a:ext cx="0" cy="0"/>
+          <a:chOff x="0" y="0"/>
+          <a:chExt cx="0" cy="0"/>
+        </a:xfrm>
+      </p:grpSpPr>
+      <p:sp>
+        <p:nvSpPr>
+          <p:cNvPr id="2" name="Title 1">
+            <a:extLst>
+              <a:ext uri="{FF2B5EF4-FFF2-40B4-BE49-F238E27FC236}">
+                <a16:creationId xmlns:a16="http://schemas.microsoft.com/office/drawing/2014/main" id="{0E74A041-0BAA-24E7-2908-761FB2D33739}"/>
+              </a:ext>
+            </a:extLst>
+          </p:cNvPr>
+          <p:cNvSpPr>
+            <a:spLocks noGrp="1"/>
+          </p:cNvSpPr>
+          <p:nvPr>
+            <p:ph type="title"/>
+          </p:nvPr>
+        </p:nvSpPr>
+        <p:spPr/>
+        <p:txBody>
+          <a:bodyPr/>
+          <a:lstStyle/>
+          <a:p>
+            <a:r>
+              <a:rPr lang="en-US" dirty="0"/>
+              <a:t>Pending Architecture </a:t>
+            </a:r>
+          </a:p>
+        </p:txBody>
+      </p:sp>
+      <p:sp>
+        <p:nvSpPr>
+          <p:cNvPr id="3" name="Content Placeholder 2">
+            <a:extLst>
+              <a:ext uri="{FF2B5EF4-FFF2-40B4-BE49-F238E27FC236}">
+                <a16:creationId xmlns:a16="http://schemas.microsoft.com/office/drawing/2014/main" id="{BE56AE9C-4583-7FC5-9F31-2F4C5FB8CB52}"/>
+              </a:ext>
+            </a:extLst>
+          </p:cNvPr>
+          <p:cNvSpPr>
+            <a:spLocks noGrp="1"/>
+          </p:cNvSpPr>
+          <p:nvPr>
+            <p:ph idx="1"/>
+          </p:nvPr>
+        </p:nvSpPr>
+        <p:spPr/>
+        <p:txBody>
+          <a:bodyPr/>
+          <a:lstStyle/>
+          <a:p>
+            <a:r>
+              <a:rPr lang="en-US" dirty="0"/>
+              <a:t>Database Configuration</a:t>
+            </a:r>
+          </a:p>
+          <a:p>
+            <a:r>
+              <a:rPr lang="en-US" dirty="0"/>
+              <a:t>RL Agent and Algorithms</a:t>
+            </a:r>
+          </a:p>
+          <a:p>
+            <a:r>
+              <a:rPr lang="en-US" dirty="0"/>
+              <a:t>User Interface</a:t>
+            </a:r>
+          </a:p>
+          <a:p>
+            <a:r>
+              <a:rPr lang="en-US" dirty="0"/>
+              <a:t>Feedback Loop</a:t>
+            </a:r>
+          </a:p>
+          <a:p>
+            <a:r>
+              <a:rPr lang="en-US" dirty="0"/>
+              <a:t>Documentation</a:t>
+            </a:r>
+          </a:p>
+        </p:txBody>
+      </p:sp>
+    </p:spTree>
+    <p:extLst>
+      <p:ext uri="{BB962C8B-B14F-4D97-AF65-F5344CB8AC3E}">
+        <p14:creationId xmlns:p14="http://schemas.microsoft.com/office/powerpoint/2010/main" val="4195925113"/>
+      </p:ext>
+    </p:extLst>
+  </p:cSld>
+  <p:clrMapOvr>
+    <a:masterClrMapping/>
+  </p:clrMapOvr>
+</p:sld>
+</file>
+
+<file path=ppt/slides/slide26.xml><?xml version="1.0" encoding="utf-8"?>
+<p:sld xmlns:a="http://schemas.openxmlformats.org/drawingml/2006/main" xmlns:r="http://schemas.openxmlformats.org/officeDocument/2006/relationships" xmlns:p="http://schemas.openxmlformats.org/presentationml/2006/main">
+  <p:cSld>
+    <p:spTree>
+      <p:nvGrpSpPr>
+        <p:cNvPr id="1" name=""/>
+        <p:cNvGrpSpPr/>
+        <p:nvPr/>
+      </p:nvGrpSpPr>
+      <p:grpSpPr>
+        <a:xfrm>
+          <a:off x="0" y="0"/>
+          <a:ext cx="0" cy="0"/>
+          <a:chOff x="0" y="0"/>
+          <a:chExt cx="0" cy="0"/>
+        </a:xfrm>
+      </p:grpSpPr>
+      <p:sp>
+        <p:nvSpPr>
+          <p:cNvPr id="2" name="Title 1">
+            <a:extLst>
+              <a:ext uri="{FF2B5EF4-FFF2-40B4-BE49-F238E27FC236}">
+                <a16:creationId xmlns:a16="http://schemas.microsoft.com/office/drawing/2014/main" id="{45AE1356-FF3F-8020-F581-09833A016672}"/>
+              </a:ext>
+            </a:extLst>
+          </p:cNvPr>
+          <p:cNvSpPr>
+            <a:spLocks noGrp="1"/>
+          </p:cNvSpPr>
+          <p:nvPr>
+            <p:ph type="ctrTitle"/>
+          </p:nvPr>
+        </p:nvSpPr>
+        <p:spPr/>
+        <p:txBody>
+          <a:bodyPr>
+            <a:normAutofit/>
+          </a:bodyPr>
+          <a:lstStyle/>
+          <a:p>
+            <a:r>
+              <a:rPr lang="en-US" sz="5400" dirty="0"/>
+              <a:t>Thank you</a:t>
+            </a:r>
+          </a:p>
+        </p:txBody>
+      </p:sp>
+    </p:spTree>
+    <p:extLst>
+      <p:ext uri="{BB962C8B-B14F-4D97-AF65-F5344CB8AC3E}">
+        <p14:creationId xmlns:p14="http://schemas.microsoft.com/office/powerpoint/2010/main" val="1591205852"/>
       </p:ext>
     </p:extLst>
   </p:cSld>

</xml_diff>